<commit_message>
This is an update on one of my weekly reports
</commit_message>
<xml_diff>
--- a/Weekly Meetings/HEP_Angular_Distributions_Presentation_29May2019.pptx
+++ b/Weekly Meetings/HEP_Angular_Distributions_Presentation_29May2019.pptx
@@ -5,22 +5,25 @@
     <p:sldMasterId id="2147483875" r:id="rId1"/>
   </p:sldMasterIdLst>
   <p:notesMasterIdLst>
-    <p:notesMasterId r:id="rId15"/>
+    <p:notesMasterId r:id="rId18"/>
   </p:notesMasterIdLst>
   <p:sldIdLst>
     <p:sldId id="256" r:id="rId2"/>
-    <p:sldId id="258" r:id="rId3"/>
-    <p:sldId id="259" r:id="rId4"/>
-    <p:sldId id="260" r:id="rId5"/>
-    <p:sldId id="261" r:id="rId6"/>
-    <p:sldId id="262" r:id="rId7"/>
-    <p:sldId id="263" r:id="rId8"/>
-    <p:sldId id="264" r:id="rId9"/>
-    <p:sldId id="265" r:id="rId10"/>
-    <p:sldId id="266" r:id="rId11"/>
-    <p:sldId id="267" r:id="rId12"/>
-    <p:sldId id="268" r:id="rId13"/>
-    <p:sldId id="269" r:id="rId14"/>
+    <p:sldId id="271" r:id="rId3"/>
+    <p:sldId id="272" r:id="rId4"/>
+    <p:sldId id="273" r:id="rId5"/>
+    <p:sldId id="270" r:id="rId6"/>
+    <p:sldId id="259" r:id="rId7"/>
+    <p:sldId id="260" r:id="rId8"/>
+    <p:sldId id="261" r:id="rId9"/>
+    <p:sldId id="262" r:id="rId10"/>
+    <p:sldId id="263" r:id="rId11"/>
+    <p:sldId id="264" r:id="rId12"/>
+    <p:sldId id="265" r:id="rId13"/>
+    <p:sldId id="266" r:id="rId14"/>
+    <p:sldId id="267" r:id="rId15"/>
+    <p:sldId id="268" r:id="rId16"/>
+    <p:sldId id="269" r:id="rId17"/>
   </p:sldIdLst>
   <p:sldSz cx="12192000" cy="6858000"/>
   <p:notesSz cx="6858000" cy="9144000"/>
@@ -209,7 +212,7 @@
           <a:p>
             <a:fld id="{E0F3FC76-411E-494E-BBF7-54618820D3D9}" type="datetimeFigureOut">
               <a:rPr lang="en-GB" smtClean="0"/>
-              <a:t>28/05/2019</a:t>
+              <a:t>29/05/2019</a:t>
             </a:fld>
             <a:endParaRPr lang="en-GB"/>
           </a:p>
@@ -635,7 +638,7 @@
     </p:spTree>
     <p:extLst>
       <p:ext uri="{BB962C8B-B14F-4D97-AF65-F5344CB8AC3E}">
-        <p14:creationId xmlns:p14="http://schemas.microsoft.com/office/powerpoint/2010/main" val="3594357156"/>
+        <p14:creationId xmlns:p14="http://schemas.microsoft.com/office/powerpoint/2010/main" val="2712828136"/>
       </p:ext>
     </p:extLst>
   </p:cSld>
@@ -719,7 +722,7 @@
     </p:spTree>
     <p:extLst>
       <p:ext uri="{BB962C8B-B14F-4D97-AF65-F5344CB8AC3E}">
-        <p14:creationId xmlns:p14="http://schemas.microsoft.com/office/powerpoint/2010/main" val="90411331"/>
+        <p14:creationId xmlns:p14="http://schemas.microsoft.com/office/powerpoint/2010/main" val="1835934929"/>
       </p:ext>
     </p:extLst>
   </p:cSld>
@@ -803,7 +806,7 @@
     </p:spTree>
     <p:extLst>
       <p:ext uri="{BB962C8B-B14F-4D97-AF65-F5344CB8AC3E}">
-        <p14:creationId xmlns:p14="http://schemas.microsoft.com/office/powerpoint/2010/main" val="4118507701"/>
+        <p14:creationId xmlns:p14="http://schemas.microsoft.com/office/powerpoint/2010/main" val="2885603756"/>
       </p:ext>
     </p:extLst>
   </p:cSld>
@@ -879,6 +882,258 @@
             <a:fld id="{DDE251E9-812E-4854-B6DD-3E1C329A13AA}" type="slidenum">
               <a:rPr lang="en-GB" smtClean="0"/>
               <a:t>13</a:t>
+            </a:fld>
+            <a:endParaRPr lang="en-GB"/>
+          </a:p>
+        </p:txBody>
+      </p:sp>
+    </p:spTree>
+    <p:extLst>
+      <p:ext uri="{BB962C8B-B14F-4D97-AF65-F5344CB8AC3E}">
+        <p14:creationId xmlns:p14="http://schemas.microsoft.com/office/powerpoint/2010/main" val="3594357156"/>
+      </p:ext>
+    </p:extLst>
+  </p:cSld>
+  <p:clrMapOvr>
+    <a:masterClrMapping/>
+  </p:clrMapOvr>
+</p:notes>
+</file>
+
+<file path=ppt/notesSlides/notesSlide14.xml><?xml version="1.0" encoding="utf-8"?>
+<p:notes xmlns:a="http://schemas.openxmlformats.org/drawingml/2006/main" xmlns:r="http://schemas.openxmlformats.org/officeDocument/2006/relationships" xmlns:p="http://schemas.openxmlformats.org/presentationml/2006/main">
+  <p:cSld>
+    <p:spTree>
+      <p:nvGrpSpPr>
+        <p:cNvPr id="1" name=""/>
+        <p:cNvGrpSpPr/>
+        <p:nvPr/>
+      </p:nvGrpSpPr>
+      <p:grpSpPr>
+        <a:xfrm>
+          <a:off x="0" y="0"/>
+          <a:ext cx="0" cy="0"/>
+          <a:chOff x="0" y="0"/>
+          <a:chExt cx="0" cy="0"/>
+        </a:xfrm>
+      </p:grpSpPr>
+      <p:sp>
+        <p:nvSpPr>
+          <p:cNvPr id="2" name="Slide Image Placeholder 1"/>
+          <p:cNvSpPr>
+            <a:spLocks noGrp="1" noRot="1" noChangeAspect="1"/>
+          </p:cNvSpPr>
+          <p:nvPr>
+            <p:ph type="sldImg"/>
+          </p:nvPr>
+        </p:nvSpPr>
+        <p:spPr/>
+      </p:sp>
+      <p:sp>
+        <p:nvSpPr>
+          <p:cNvPr id="3" name="Notes Placeholder 2"/>
+          <p:cNvSpPr>
+            <a:spLocks noGrp="1"/>
+          </p:cNvSpPr>
+          <p:nvPr>
+            <p:ph type="body" idx="1"/>
+          </p:nvPr>
+        </p:nvSpPr>
+        <p:spPr/>
+        <p:txBody>
+          <a:bodyPr/>
+          <a:lstStyle/>
+          <a:p>
+            <a:endParaRPr lang="en-GB" dirty="0"/>
+          </a:p>
+        </p:txBody>
+      </p:sp>
+      <p:sp>
+        <p:nvSpPr>
+          <p:cNvPr id="4" name="Slide Number Placeholder 3"/>
+          <p:cNvSpPr>
+            <a:spLocks noGrp="1"/>
+          </p:cNvSpPr>
+          <p:nvPr>
+            <p:ph type="sldNum" sz="quarter" idx="10"/>
+          </p:nvPr>
+        </p:nvSpPr>
+        <p:spPr/>
+        <p:txBody>
+          <a:bodyPr/>
+          <a:lstStyle/>
+          <a:p>
+            <a:fld id="{DDE251E9-812E-4854-B6DD-3E1C329A13AA}" type="slidenum">
+              <a:rPr lang="en-GB" smtClean="0"/>
+              <a:t>14</a:t>
+            </a:fld>
+            <a:endParaRPr lang="en-GB"/>
+          </a:p>
+        </p:txBody>
+      </p:sp>
+    </p:spTree>
+    <p:extLst>
+      <p:ext uri="{BB962C8B-B14F-4D97-AF65-F5344CB8AC3E}">
+        <p14:creationId xmlns:p14="http://schemas.microsoft.com/office/powerpoint/2010/main" val="90411331"/>
+      </p:ext>
+    </p:extLst>
+  </p:cSld>
+  <p:clrMapOvr>
+    <a:masterClrMapping/>
+  </p:clrMapOvr>
+</p:notes>
+</file>
+
+<file path=ppt/notesSlides/notesSlide15.xml><?xml version="1.0" encoding="utf-8"?>
+<p:notes xmlns:a="http://schemas.openxmlformats.org/drawingml/2006/main" xmlns:r="http://schemas.openxmlformats.org/officeDocument/2006/relationships" xmlns:p="http://schemas.openxmlformats.org/presentationml/2006/main">
+  <p:cSld>
+    <p:spTree>
+      <p:nvGrpSpPr>
+        <p:cNvPr id="1" name=""/>
+        <p:cNvGrpSpPr/>
+        <p:nvPr/>
+      </p:nvGrpSpPr>
+      <p:grpSpPr>
+        <a:xfrm>
+          <a:off x="0" y="0"/>
+          <a:ext cx="0" cy="0"/>
+          <a:chOff x="0" y="0"/>
+          <a:chExt cx="0" cy="0"/>
+        </a:xfrm>
+      </p:grpSpPr>
+      <p:sp>
+        <p:nvSpPr>
+          <p:cNvPr id="2" name="Slide Image Placeholder 1"/>
+          <p:cNvSpPr>
+            <a:spLocks noGrp="1" noRot="1" noChangeAspect="1"/>
+          </p:cNvSpPr>
+          <p:nvPr>
+            <p:ph type="sldImg"/>
+          </p:nvPr>
+        </p:nvSpPr>
+        <p:spPr/>
+      </p:sp>
+      <p:sp>
+        <p:nvSpPr>
+          <p:cNvPr id="3" name="Notes Placeholder 2"/>
+          <p:cNvSpPr>
+            <a:spLocks noGrp="1"/>
+          </p:cNvSpPr>
+          <p:nvPr>
+            <p:ph type="body" idx="1"/>
+          </p:nvPr>
+        </p:nvSpPr>
+        <p:spPr/>
+        <p:txBody>
+          <a:bodyPr/>
+          <a:lstStyle/>
+          <a:p>
+            <a:endParaRPr lang="en-GB" dirty="0"/>
+          </a:p>
+        </p:txBody>
+      </p:sp>
+      <p:sp>
+        <p:nvSpPr>
+          <p:cNvPr id="4" name="Slide Number Placeholder 3"/>
+          <p:cNvSpPr>
+            <a:spLocks noGrp="1"/>
+          </p:cNvSpPr>
+          <p:nvPr>
+            <p:ph type="sldNum" sz="quarter" idx="10"/>
+          </p:nvPr>
+        </p:nvSpPr>
+        <p:spPr/>
+        <p:txBody>
+          <a:bodyPr/>
+          <a:lstStyle/>
+          <a:p>
+            <a:fld id="{DDE251E9-812E-4854-B6DD-3E1C329A13AA}" type="slidenum">
+              <a:rPr lang="en-GB" smtClean="0"/>
+              <a:t>15</a:t>
+            </a:fld>
+            <a:endParaRPr lang="en-GB"/>
+          </a:p>
+        </p:txBody>
+      </p:sp>
+    </p:spTree>
+    <p:extLst>
+      <p:ext uri="{BB962C8B-B14F-4D97-AF65-F5344CB8AC3E}">
+        <p14:creationId xmlns:p14="http://schemas.microsoft.com/office/powerpoint/2010/main" val="4118507701"/>
+      </p:ext>
+    </p:extLst>
+  </p:cSld>
+  <p:clrMapOvr>
+    <a:masterClrMapping/>
+  </p:clrMapOvr>
+</p:notes>
+</file>
+
+<file path=ppt/notesSlides/notesSlide16.xml><?xml version="1.0" encoding="utf-8"?>
+<p:notes xmlns:a="http://schemas.openxmlformats.org/drawingml/2006/main" xmlns:r="http://schemas.openxmlformats.org/officeDocument/2006/relationships" xmlns:p="http://schemas.openxmlformats.org/presentationml/2006/main">
+  <p:cSld>
+    <p:spTree>
+      <p:nvGrpSpPr>
+        <p:cNvPr id="1" name=""/>
+        <p:cNvGrpSpPr/>
+        <p:nvPr/>
+      </p:nvGrpSpPr>
+      <p:grpSpPr>
+        <a:xfrm>
+          <a:off x="0" y="0"/>
+          <a:ext cx="0" cy="0"/>
+          <a:chOff x="0" y="0"/>
+          <a:chExt cx="0" cy="0"/>
+        </a:xfrm>
+      </p:grpSpPr>
+      <p:sp>
+        <p:nvSpPr>
+          <p:cNvPr id="2" name="Slide Image Placeholder 1"/>
+          <p:cNvSpPr>
+            <a:spLocks noGrp="1" noRot="1" noChangeAspect="1"/>
+          </p:cNvSpPr>
+          <p:nvPr>
+            <p:ph type="sldImg"/>
+          </p:nvPr>
+        </p:nvSpPr>
+        <p:spPr/>
+      </p:sp>
+      <p:sp>
+        <p:nvSpPr>
+          <p:cNvPr id="3" name="Notes Placeholder 2"/>
+          <p:cNvSpPr>
+            <a:spLocks noGrp="1"/>
+          </p:cNvSpPr>
+          <p:nvPr>
+            <p:ph type="body" idx="1"/>
+          </p:nvPr>
+        </p:nvSpPr>
+        <p:spPr/>
+        <p:txBody>
+          <a:bodyPr/>
+          <a:lstStyle/>
+          <a:p>
+            <a:endParaRPr lang="en-GB" dirty="0"/>
+          </a:p>
+        </p:txBody>
+      </p:sp>
+      <p:sp>
+        <p:nvSpPr>
+          <p:cNvPr id="4" name="Slide Number Placeholder 3"/>
+          <p:cNvSpPr>
+            <a:spLocks noGrp="1"/>
+          </p:cNvSpPr>
+          <p:nvPr>
+            <p:ph type="sldNum" sz="quarter" idx="10"/>
+          </p:nvPr>
+        </p:nvSpPr>
+        <p:spPr/>
+        <p:txBody>
+          <a:bodyPr/>
+          <a:lstStyle/>
+          <a:p>
+            <a:fld id="{DDE251E9-812E-4854-B6DD-3E1C329A13AA}" type="slidenum">
+              <a:rPr lang="en-GB" smtClean="0"/>
+              <a:t>16</a:t>
             </a:fld>
             <a:endParaRPr lang="en-GB"/>
           </a:p>
@@ -971,7 +1226,7 @@
     </p:spTree>
     <p:extLst>
       <p:ext uri="{BB962C8B-B14F-4D97-AF65-F5344CB8AC3E}">
-        <p14:creationId xmlns:p14="http://schemas.microsoft.com/office/powerpoint/2010/main" val="2036346156"/>
+        <p14:creationId xmlns:p14="http://schemas.microsoft.com/office/powerpoint/2010/main" val="297905031"/>
       </p:ext>
     </p:extLst>
   </p:cSld>
@@ -1055,7 +1310,7 @@
     </p:spTree>
     <p:extLst>
       <p:ext uri="{BB962C8B-B14F-4D97-AF65-F5344CB8AC3E}">
-        <p14:creationId xmlns:p14="http://schemas.microsoft.com/office/powerpoint/2010/main" val="1092753250"/>
+        <p14:creationId xmlns:p14="http://schemas.microsoft.com/office/powerpoint/2010/main" val="2813527830"/>
       </p:ext>
     </p:extLst>
   </p:cSld>
@@ -1139,7 +1394,7 @@
     </p:spTree>
     <p:extLst>
       <p:ext uri="{BB962C8B-B14F-4D97-AF65-F5344CB8AC3E}">
-        <p14:creationId xmlns:p14="http://schemas.microsoft.com/office/powerpoint/2010/main" val="1600703986"/>
+        <p14:creationId xmlns:p14="http://schemas.microsoft.com/office/powerpoint/2010/main" val="885824421"/>
       </p:ext>
     </p:extLst>
   </p:cSld>
@@ -1223,7 +1478,7 @@
     </p:spTree>
     <p:extLst>
       <p:ext uri="{BB962C8B-B14F-4D97-AF65-F5344CB8AC3E}">
-        <p14:creationId xmlns:p14="http://schemas.microsoft.com/office/powerpoint/2010/main" val="3418389591"/>
+        <p14:creationId xmlns:p14="http://schemas.microsoft.com/office/powerpoint/2010/main" val="2754595323"/>
       </p:ext>
     </p:extLst>
   </p:cSld>
@@ -1307,7 +1562,7 @@
     </p:spTree>
     <p:extLst>
       <p:ext uri="{BB962C8B-B14F-4D97-AF65-F5344CB8AC3E}">
-        <p14:creationId xmlns:p14="http://schemas.microsoft.com/office/powerpoint/2010/main" val="1157169101"/>
+        <p14:creationId xmlns:p14="http://schemas.microsoft.com/office/powerpoint/2010/main" val="1092753250"/>
       </p:ext>
     </p:extLst>
   </p:cSld>
@@ -1391,7 +1646,7 @@
     </p:spTree>
     <p:extLst>
       <p:ext uri="{BB962C8B-B14F-4D97-AF65-F5344CB8AC3E}">
-        <p14:creationId xmlns:p14="http://schemas.microsoft.com/office/powerpoint/2010/main" val="2712828136"/>
+        <p14:creationId xmlns:p14="http://schemas.microsoft.com/office/powerpoint/2010/main" val="1600703986"/>
       </p:ext>
     </p:extLst>
   </p:cSld>
@@ -1475,7 +1730,7 @@
     </p:spTree>
     <p:extLst>
       <p:ext uri="{BB962C8B-B14F-4D97-AF65-F5344CB8AC3E}">
-        <p14:creationId xmlns:p14="http://schemas.microsoft.com/office/powerpoint/2010/main" val="1835934929"/>
+        <p14:creationId xmlns:p14="http://schemas.microsoft.com/office/powerpoint/2010/main" val="3418389591"/>
       </p:ext>
     </p:extLst>
   </p:cSld>
@@ -1559,7 +1814,7 @@
     </p:spTree>
     <p:extLst>
       <p:ext uri="{BB962C8B-B14F-4D97-AF65-F5344CB8AC3E}">
-        <p14:creationId xmlns:p14="http://schemas.microsoft.com/office/powerpoint/2010/main" val="2885603756"/>
+        <p14:creationId xmlns:p14="http://schemas.microsoft.com/office/powerpoint/2010/main" val="1157169101"/>
       </p:ext>
     </p:extLst>
   </p:cSld>
@@ -1795,7 +2050,7 @@
           <a:p>
             <a:fld id="{B93549DA-7207-4101-AC01-D8C7F0838AF9}" type="datetime3">
               <a:rPr lang="en-US" smtClean="0"/>
-              <a:t>28 May 2019</a:t>
+              <a:t>29 May 2019</a:t>
             </a:fld>
             <a:endParaRPr lang="en-US"/>
           </a:p>
@@ -2007,7 +2262,7 @@
           <a:p>
             <a:fld id="{6B3356D6-5AFA-4697-BF1B-5B11FC6D9C3F}" type="datetime3">
               <a:rPr lang="en-US" smtClean="0"/>
-              <a:t>28 May 2019</a:t>
+              <a:t>29 May 2019</a:t>
             </a:fld>
             <a:endParaRPr lang="en-US"/>
           </a:p>
@@ -2267,7 +2522,7 @@
           <a:p>
             <a:fld id="{39C458AD-A59C-4C0B-BF35-CC776F25ED60}" type="datetime3">
               <a:rPr lang="en-US" smtClean="0"/>
-              <a:t>28 May 2019</a:t>
+              <a:t>29 May 2019</a:t>
             </a:fld>
             <a:endParaRPr lang="en-US"/>
           </a:p>
@@ -2441,7 +2696,7 @@
           <a:p>
             <a:fld id="{13143EFC-DA6C-4B2A-A663-25194C68352E}" type="datetime3">
               <a:rPr lang="en-US" smtClean="0"/>
-              <a:t>28 May 2019</a:t>
+              <a:t>29 May 2019</a:t>
             </a:fld>
             <a:endParaRPr lang="en-US"/>
           </a:p>
@@ -2788,7 +3043,7 @@
           <a:p>
             <a:fld id="{10EBF91E-F74B-43D8-9A96-5E5AED4A0583}" type="datetime3">
               <a:rPr lang="en-US" smtClean="0"/>
-              <a:t>28 May 2019</a:t>
+              <a:t>29 May 2019</a:t>
             </a:fld>
             <a:endParaRPr lang="en-US"/>
           </a:p>
@@ -3067,7 +3322,7 @@
           <a:p>
             <a:fld id="{EF68B882-6789-4EFD-B927-92F14706BDF7}" type="datetime3">
               <a:rPr lang="en-US" smtClean="0"/>
-              <a:t>28 May 2019</a:t>
+              <a:t>29 May 2019</a:t>
             </a:fld>
             <a:endParaRPr lang="en-US"/>
           </a:p>
@@ -3450,7 +3705,7 @@
           <a:p>
             <a:fld id="{69FC1DD0-08B2-43B3-AEF0-BF606E1E934B}" type="datetime3">
               <a:rPr lang="en-US" smtClean="0"/>
-              <a:t>28 May 2019</a:t>
+              <a:t>29 May 2019</a:t>
             </a:fld>
             <a:endParaRPr lang="en-US"/>
           </a:p>
@@ -3572,7 +3827,7 @@
           <a:p>
             <a:fld id="{4C7E968B-DB77-4620-B607-92BCA7FAA7C4}" type="datetime3">
               <a:rPr lang="en-US" smtClean="0"/>
-              <a:t>28 May 2019</a:t>
+              <a:t>29 May 2019</a:t>
             </a:fld>
             <a:endParaRPr lang="en-US"/>
           </a:p>
@@ -3747,7 +4002,7 @@
           <a:p>
             <a:fld id="{136A9F13-2635-4BC3-9FB2-FA4EB28723A3}" type="datetime3">
               <a:rPr lang="en-US" smtClean="0"/>
-              <a:t>28 May 2019</a:t>
+              <a:t>29 May 2019</a:t>
             </a:fld>
             <a:endParaRPr lang="en-US"/>
           </a:p>
@@ -4105,7 +4360,7 @@
           <a:p>
             <a:fld id="{5A316585-6219-423D-B9A1-CA72626759B2}" type="datetime3">
               <a:rPr lang="en-US" smtClean="0"/>
-              <a:t>28 May 2019</a:t>
+              <a:t>29 May 2019</a:t>
             </a:fld>
             <a:endParaRPr lang="en-US"/>
           </a:p>
@@ -4486,7 +4741,7 @@
           <a:p>
             <a:fld id="{BFD9067D-9751-4010-B63A-2F1ED6E5E699}" type="datetime3">
               <a:rPr lang="en-US" smtClean="0"/>
-              <a:t>28 May 2019</a:t>
+              <a:t>29 May 2019</a:t>
             </a:fld>
             <a:endParaRPr lang="en-US"/>
           </a:p>
@@ -4777,7 +5032,7 @@
           <a:p>
             <a:fld id="{A24F5CAB-D6EB-4020-8ED6-55735DF143A1}" type="datetime3">
               <a:rPr lang="en-US" smtClean="0"/>
-              <a:t>28 May 2019</a:t>
+              <a:t>29 May 2019</a:t>
             </a:fld>
             <a:endParaRPr lang="en-US"/>
           </a:p>
@@ -5360,10 +5615,6 @@
             <a:br>
               <a:rPr lang="en-US" sz="4500" dirty="0"/>
             </a:br>
-            <a:r>
-              <a:rPr lang="en-US" sz="4500" dirty="0"/>
-              <a:t/>
-            </a:r>
             <a:br>
               <a:rPr lang="en-US" sz="4500" dirty="0"/>
             </a:br>
@@ -5525,7 +5776,7 @@
           <a:p>
             <a:fld id="{482AA653-8872-4AEA-B19D-0BF0F1064A5A}" type="datetime3">
               <a:rPr lang="en-US" smtClean="0"/>
-              <a:t>28 May 2019</a:t>
+              <a:t>29 May 2019</a:t>
             </a:fld>
             <a:endParaRPr lang="en-US"/>
           </a:p>
@@ -5572,6 +5823,693 @@
             <a:fld id="{AEEFAC8D-0A19-DC49-9F7A-4BFCAD95B105}" type="slidenum">
               <a:rPr lang="en-US" smtClean="0"/>
               <a:t>10</a:t>
+            </a:fld>
+            <a:endParaRPr lang="en-US"/>
+          </a:p>
+        </p:txBody>
+      </p:sp>
+      <p:pic>
+        <p:nvPicPr>
+          <p:cNvPr id="12" name="Picture 11"/>
+          <p:cNvPicPr>
+            <a:picLocks noChangeAspect="1"/>
+          </p:cNvPicPr>
+          <p:nvPr/>
+        </p:nvPicPr>
+        <p:blipFill>
+          <a:blip r:embed="rId3">
+            <a:extLst>
+              <a:ext uri="{28A0092B-C50C-407E-A947-70E740481C1C}">
+                <a14:useLocalDpi xmlns:a14="http://schemas.microsoft.com/office/drawing/2010/main" val="0"/>
+              </a:ext>
+            </a:extLst>
+          </a:blip>
+          <a:stretch>
+            <a:fillRect/>
+          </a:stretch>
+        </p:blipFill>
+        <p:spPr>
+          <a:xfrm>
+            <a:off x="0" y="811762"/>
+            <a:ext cx="5559743" cy="4462278"/>
+          </a:xfrm>
+          <a:prstGeom prst="rect">
+            <a:avLst/>
+          </a:prstGeom>
+        </p:spPr>
+      </p:pic>
+      <p:pic>
+        <p:nvPicPr>
+          <p:cNvPr id="13" name="Picture 12"/>
+          <p:cNvPicPr>
+            <a:picLocks noChangeAspect="1"/>
+          </p:cNvPicPr>
+          <p:nvPr/>
+        </p:nvPicPr>
+        <p:blipFill>
+          <a:blip r:embed="rId4">
+            <a:extLst>
+              <a:ext uri="{28A0092B-C50C-407E-A947-70E740481C1C}">
+                <a14:useLocalDpi xmlns:a14="http://schemas.microsoft.com/office/drawing/2010/main" val="0"/>
+              </a:ext>
+            </a:extLst>
+          </a:blip>
+          <a:stretch>
+            <a:fillRect/>
+          </a:stretch>
+        </p:blipFill>
+        <p:spPr>
+          <a:xfrm>
+            <a:off x="6316632" y="746448"/>
+            <a:ext cx="5559743" cy="4527592"/>
+          </a:xfrm>
+          <a:prstGeom prst="rect">
+            <a:avLst/>
+          </a:prstGeom>
+        </p:spPr>
+      </p:pic>
+      <p:pic>
+        <p:nvPicPr>
+          <p:cNvPr id="14" name="Picture 13"/>
+          <p:cNvPicPr>
+            <a:picLocks noChangeAspect="1"/>
+          </p:cNvPicPr>
+          <p:nvPr/>
+        </p:nvPicPr>
+        <p:blipFill>
+          <a:blip r:embed="rId5"/>
+          <a:stretch>
+            <a:fillRect/>
+          </a:stretch>
+        </p:blipFill>
+        <p:spPr>
+          <a:xfrm>
+            <a:off x="4541174" y="5061413"/>
+            <a:ext cx="549285" cy="189573"/>
+          </a:xfrm>
+          <a:prstGeom prst="rect">
+            <a:avLst/>
+          </a:prstGeom>
+        </p:spPr>
+      </p:pic>
+      <p:pic>
+        <p:nvPicPr>
+          <p:cNvPr id="15" name="Picture 14"/>
+          <p:cNvPicPr>
+            <a:picLocks noChangeAspect="1"/>
+          </p:cNvPicPr>
+          <p:nvPr/>
+        </p:nvPicPr>
+        <p:blipFill>
+          <a:blip r:embed="rId5"/>
+          <a:stretch>
+            <a:fillRect/>
+          </a:stretch>
+        </p:blipFill>
+        <p:spPr>
+          <a:xfrm>
+            <a:off x="10805125" y="5060131"/>
+            <a:ext cx="549285" cy="189573"/>
+          </a:xfrm>
+          <a:prstGeom prst="rect">
+            <a:avLst/>
+          </a:prstGeom>
+        </p:spPr>
+      </p:pic>
+      <p:pic>
+        <p:nvPicPr>
+          <p:cNvPr id="16" name="Picture 15"/>
+          <p:cNvPicPr>
+            <a:picLocks noChangeAspect="1"/>
+          </p:cNvPicPr>
+          <p:nvPr/>
+        </p:nvPicPr>
+        <p:blipFill>
+          <a:blip r:embed="rId6"/>
+          <a:stretch>
+            <a:fillRect/>
+          </a:stretch>
+        </p:blipFill>
+        <p:spPr>
+          <a:xfrm>
+            <a:off x="173103" y="1244374"/>
+            <a:ext cx="209122" cy="472460"/>
+          </a:xfrm>
+          <a:prstGeom prst="rect">
+            <a:avLst/>
+          </a:prstGeom>
+        </p:spPr>
+      </p:pic>
+      <p:pic>
+        <p:nvPicPr>
+          <p:cNvPr id="17" name="Picture 16"/>
+          <p:cNvPicPr>
+            <a:picLocks noChangeAspect="1"/>
+          </p:cNvPicPr>
+          <p:nvPr/>
+        </p:nvPicPr>
+        <p:blipFill>
+          <a:blip r:embed="rId6"/>
+          <a:stretch>
+            <a:fillRect/>
+          </a:stretch>
+        </p:blipFill>
+        <p:spPr>
+          <a:xfrm>
+            <a:off x="6474377" y="1250887"/>
+            <a:ext cx="209122" cy="472460"/>
+          </a:xfrm>
+          <a:prstGeom prst="rect">
+            <a:avLst/>
+          </a:prstGeom>
+        </p:spPr>
+      </p:pic>
+    </p:spTree>
+    <p:extLst>
+      <p:ext uri="{BB962C8B-B14F-4D97-AF65-F5344CB8AC3E}">
+        <p14:creationId xmlns:p14="http://schemas.microsoft.com/office/powerpoint/2010/main" val="779823611"/>
+      </p:ext>
+    </p:extLst>
+  </p:cSld>
+  <p:clrMapOvr>
+    <a:masterClrMapping/>
+  </p:clrMapOvr>
+</p:sld>
+</file>
+
+<file path=ppt/slides/slide11.xml><?xml version="1.0" encoding="utf-8"?>
+<p:sld xmlns:a="http://schemas.openxmlformats.org/drawingml/2006/main" xmlns:r="http://schemas.openxmlformats.org/officeDocument/2006/relationships" xmlns:p="http://schemas.openxmlformats.org/presentationml/2006/main">
+  <p:cSld>
+    <p:spTree>
+      <p:nvGrpSpPr>
+        <p:cNvPr id="1" name=""/>
+        <p:cNvGrpSpPr/>
+        <p:nvPr/>
+      </p:nvGrpSpPr>
+      <p:grpSpPr>
+        <a:xfrm>
+          <a:off x="0" y="0"/>
+          <a:ext cx="0" cy="0"/>
+          <a:chOff x="0" y="0"/>
+          <a:chExt cx="0" cy="0"/>
+        </a:xfrm>
+      </p:grpSpPr>
+      <p:sp>
+        <p:nvSpPr>
+          <p:cNvPr id="2" name="Date Placeholder 1"/>
+          <p:cNvSpPr>
+            <a:spLocks noGrp="1"/>
+          </p:cNvSpPr>
+          <p:nvPr>
+            <p:ph type="dt" sz="half" idx="10"/>
+          </p:nvPr>
+        </p:nvSpPr>
+        <p:spPr/>
+        <p:txBody>
+          <a:bodyPr/>
+          <a:lstStyle/>
+          <a:p>
+            <a:fld id="{482AA653-8872-4AEA-B19D-0BF0F1064A5A}" type="datetime3">
+              <a:rPr lang="en-US" smtClean="0"/>
+              <a:t>29 May 2019</a:t>
+            </a:fld>
+            <a:endParaRPr lang="en-US"/>
+          </a:p>
+        </p:txBody>
+      </p:sp>
+      <p:sp>
+        <p:nvSpPr>
+          <p:cNvPr id="3" name="Footer Placeholder 2"/>
+          <p:cNvSpPr>
+            <a:spLocks noGrp="1"/>
+          </p:cNvSpPr>
+          <p:nvPr>
+            <p:ph type="ftr" sz="quarter" idx="11"/>
+          </p:nvPr>
+        </p:nvSpPr>
+        <p:spPr/>
+        <p:txBody>
+          <a:bodyPr/>
+          <a:lstStyle/>
+          <a:p>
+            <a:r>
+              <a:rPr lang="fi-FI"/>
+              <a:t>NTUA, G. Bakas</a:t>
+            </a:r>
+            <a:endParaRPr lang="en-US"/>
+          </a:p>
+        </p:txBody>
+      </p:sp>
+      <p:sp>
+        <p:nvSpPr>
+          <p:cNvPr id="6" name="Slide Number Placeholder 5"/>
+          <p:cNvSpPr>
+            <a:spLocks noGrp="1"/>
+          </p:cNvSpPr>
+          <p:nvPr>
+            <p:ph type="sldNum" sz="quarter" idx="12"/>
+          </p:nvPr>
+        </p:nvSpPr>
+        <p:spPr/>
+        <p:txBody>
+          <a:bodyPr/>
+          <a:lstStyle/>
+          <a:p>
+            <a:fld id="{AEEFAC8D-0A19-DC49-9F7A-4BFCAD95B105}" type="slidenum">
+              <a:rPr lang="en-US" smtClean="0"/>
+              <a:t>11</a:t>
+            </a:fld>
+            <a:endParaRPr lang="en-US"/>
+          </a:p>
+        </p:txBody>
+      </p:sp>
+      <p:pic>
+        <p:nvPicPr>
+          <p:cNvPr id="4" name="Picture 3"/>
+          <p:cNvPicPr>
+            <a:picLocks noChangeAspect="1"/>
+          </p:cNvPicPr>
+          <p:nvPr/>
+        </p:nvPicPr>
+        <p:blipFill>
+          <a:blip r:embed="rId3">
+            <a:extLst>
+              <a:ext uri="{28A0092B-C50C-407E-A947-70E740481C1C}">
+                <a14:useLocalDpi xmlns:a14="http://schemas.microsoft.com/office/drawing/2010/main" val="0"/>
+              </a:ext>
+            </a:extLst>
+          </a:blip>
+          <a:stretch>
+            <a:fillRect/>
+          </a:stretch>
+        </p:blipFill>
+        <p:spPr>
+          <a:xfrm>
+            <a:off x="0" y="868038"/>
+            <a:ext cx="5962261" cy="4529995"/>
+          </a:xfrm>
+          <a:prstGeom prst="rect">
+            <a:avLst/>
+          </a:prstGeom>
+        </p:spPr>
+      </p:pic>
+      <p:pic>
+        <p:nvPicPr>
+          <p:cNvPr id="5" name="Picture 4"/>
+          <p:cNvPicPr>
+            <a:picLocks noChangeAspect="1"/>
+          </p:cNvPicPr>
+          <p:nvPr/>
+        </p:nvPicPr>
+        <p:blipFill>
+          <a:blip r:embed="rId4">
+            <a:extLst>
+              <a:ext uri="{28A0092B-C50C-407E-A947-70E740481C1C}">
+                <a14:useLocalDpi xmlns:a14="http://schemas.microsoft.com/office/drawing/2010/main" val="0"/>
+              </a:ext>
+            </a:extLst>
+          </a:blip>
+          <a:stretch>
+            <a:fillRect/>
+          </a:stretch>
+        </p:blipFill>
+        <p:spPr>
+          <a:xfrm>
+            <a:off x="6223518" y="868037"/>
+            <a:ext cx="5968482" cy="4529995"/>
+          </a:xfrm>
+          <a:prstGeom prst="rect">
+            <a:avLst/>
+          </a:prstGeom>
+        </p:spPr>
+      </p:pic>
+      <p:pic>
+        <p:nvPicPr>
+          <p:cNvPr id="7" name="Picture 6"/>
+          <p:cNvPicPr>
+            <a:picLocks noChangeAspect="1"/>
+          </p:cNvPicPr>
+          <p:nvPr/>
+        </p:nvPicPr>
+        <p:blipFill>
+          <a:blip r:embed="rId5"/>
+          <a:stretch>
+            <a:fillRect/>
+          </a:stretch>
+        </p:blipFill>
+        <p:spPr>
+          <a:xfrm>
+            <a:off x="4815817" y="5208459"/>
+            <a:ext cx="549285" cy="189573"/>
+          </a:xfrm>
+          <a:prstGeom prst="rect">
+            <a:avLst/>
+          </a:prstGeom>
+        </p:spPr>
+      </p:pic>
+      <p:pic>
+        <p:nvPicPr>
+          <p:cNvPr id="10" name="Picture 9"/>
+          <p:cNvPicPr>
+            <a:picLocks noChangeAspect="1"/>
+          </p:cNvPicPr>
+          <p:nvPr/>
+        </p:nvPicPr>
+        <p:blipFill>
+          <a:blip r:embed="rId5"/>
+          <a:stretch>
+            <a:fillRect/>
+          </a:stretch>
+        </p:blipFill>
+        <p:spPr>
+          <a:xfrm>
+            <a:off x="11079768" y="5207177"/>
+            <a:ext cx="549285" cy="189573"/>
+          </a:xfrm>
+          <a:prstGeom prst="rect">
+            <a:avLst/>
+          </a:prstGeom>
+        </p:spPr>
+      </p:pic>
+      <p:pic>
+        <p:nvPicPr>
+          <p:cNvPr id="11" name="Picture 10"/>
+          <p:cNvPicPr>
+            <a:picLocks noChangeAspect="1"/>
+          </p:cNvPicPr>
+          <p:nvPr/>
+        </p:nvPicPr>
+        <p:blipFill>
+          <a:blip r:embed="rId6"/>
+          <a:stretch>
+            <a:fillRect/>
+          </a:stretch>
+        </p:blipFill>
+        <p:spPr>
+          <a:xfrm>
+            <a:off x="157222" y="1250887"/>
+            <a:ext cx="209122" cy="472460"/>
+          </a:xfrm>
+          <a:prstGeom prst="rect">
+            <a:avLst/>
+          </a:prstGeom>
+        </p:spPr>
+      </p:pic>
+      <p:pic>
+        <p:nvPicPr>
+          <p:cNvPr id="14" name="Picture 13"/>
+          <p:cNvPicPr>
+            <a:picLocks noChangeAspect="1"/>
+          </p:cNvPicPr>
+          <p:nvPr/>
+        </p:nvPicPr>
+        <p:blipFill>
+          <a:blip r:embed="rId6"/>
+          <a:stretch>
+            <a:fillRect/>
+          </a:stretch>
+        </p:blipFill>
+        <p:spPr>
+          <a:xfrm>
+            <a:off x="6458496" y="1332045"/>
+            <a:ext cx="209122" cy="472460"/>
+          </a:xfrm>
+          <a:prstGeom prst="rect">
+            <a:avLst/>
+          </a:prstGeom>
+        </p:spPr>
+      </p:pic>
+    </p:spTree>
+    <p:extLst>
+      <p:ext uri="{BB962C8B-B14F-4D97-AF65-F5344CB8AC3E}">
+        <p14:creationId xmlns:p14="http://schemas.microsoft.com/office/powerpoint/2010/main" val="1919429513"/>
+      </p:ext>
+    </p:extLst>
+  </p:cSld>
+  <p:clrMapOvr>
+    <a:masterClrMapping/>
+  </p:clrMapOvr>
+</p:sld>
+</file>
+
+<file path=ppt/slides/slide12.xml><?xml version="1.0" encoding="utf-8"?>
+<p:sld xmlns:a="http://schemas.openxmlformats.org/drawingml/2006/main" xmlns:r="http://schemas.openxmlformats.org/officeDocument/2006/relationships" xmlns:p="http://schemas.openxmlformats.org/presentationml/2006/main">
+  <p:cSld>
+    <p:spTree>
+      <p:nvGrpSpPr>
+        <p:cNvPr id="1" name=""/>
+        <p:cNvGrpSpPr/>
+        <p:nvPr/>
+      </p:nvGrpSpPr>
+      <p:grpSpPr>
+        <a:xfrm>
+          <a:off x="0" y="0"/>
+          <a:ext cx="0" cy="0"/>
+          <a:chOff x="0" y="0"/>
+          <a:chExt cx="0" cy="0"/>
+        </a:xfrm>
+      </p:grpSpPr>
+      <p:sp>
+        <p:nvSpPr>
+          <p:cNvPr id="2" name="Date Placeholder 1"/>
+          <p:cNvSpPr>
+            <a:spLocks noGrp="1"/>
+          </p:cNvSpPr>
+          <p:nvPr>
+            <p:ph type="dt" sz="half" idx="10"/>
+          </p:nvPr>
+        </p:nvSpPr>
+        <p:spPr/>
+        <p:txBody>
+          <a:bodyPr/>
+          <a:lstStyle/>
+          <a:p>
+            <a:fld id="{482AA653-8872-4AEA-B19D-0BF0F1064A5A}" type="datetime3">
+              <a:rPr lang="en-US" smtClean="0"/>
+              <a:t>29 May 2019</a:t>
+            </a:fld>
+            <a:endParaRPr lang="en-US"/>
+          </a:p>
+        </p:txBody>
+      </p:sp>
+      <p:sp>
+        <p:nvSpPr>
+          <p:cNvPr id="3" name="Footer Placeholder 2"/>
+          <p:cNvSpPr>
+            <a:spLocks noGrp="1"/>
+          </p:cNvSpPr>
+          <p:nvPr>
+            <p:ph type="ftr" sz="quarter" idx="11"/>
+          </p:nvPr>
+        </p:nvSpPr>
+        <p:spPr/>
+        <p:txBody>
+          <a:bodyPr/>
+          <a:lstStyle/>
+          <a:p>
+            <a:r>
+              <a:rPr lang="fi-FI"/>
+              <a:t>NTUA, G. Bakas</a:t>
+            </a:r>
+            <a:endParaRPr lang="en-US"/>
+          </a:p>
+        </p:txBody>
+      </p:sp>
+      <p:sp>
+        <p:nvSpPr>
+          <p:cNvPr id="6" name="Slide Number Placeholder 5"/>
+          <p:cNvSpPr>
+            <a:spLocks noGrp="1"/>
+          </p:cNvSpPr>
+          <p:nvPr>
+            <p:ph type="sldNum" sz="quarter" idx="12"/>
+          </p:nvPr>
+        </p:nvSpPr>
+        <p:spPr/>
+        <p:txBody>
+          <a:bodyPr/>
+          <a:lstStyle/>
+          <a:p>
+            <a:fld id="{AEEFAC8D-0A19-DC49-9F7A-4BFCAD95B105}" type="slidenum">
+              <a:rPr lang="en-US" smtClean="0"/>
+              <a:t>12</a:t>
+            </a:fld>
+            <a:endParaRPr lang="en-US"/>
+          </a:p>
+        </p:txBody>
+      </p:sp>
+      <p:pic>
+        <p:nvPicPr>
+          <p:cNvPr id="7" name="Picture 6"/>
+          <p:cNvPicPr>
+            <a:picLocks noChangeAspect="1"/>
+          </p:cNvPicPr>
+          <p:nvPr/>
+        </p:nvPicPr>
+        <p:blipFill>
+          <a:blip r:embed="rId3">
+            <a:extLst>
+              <a:ext uri="{28A0092B-C50C-407E-A947-70E740481C1C}">
+                <a14:useLocalDpi xmlns:a14="http://schemas.microsoft.com/office/drawing/2010/main" val="0"/>
+              </a:ext>
+            </a:extLst>
+          </a:blip>
+          <a:stretch>
+            <a:fillRect/>
+          </a:stretch>
+        </p:blipFill>
+        <p:spPr>
+          <a:xfrm>
+            <a:off x="1819275" y="700087"/>
+            <a:ext cx="8553450" cy="5457825"/>
+          </a:xfrm>
+          <a:prstGeom prst="rect">
+            <a:avLst/>
+          </a:prstGeom>
+        </p:spPr>
+      </p:pic>
+      <p:pic>
+        <p:nvPicPr>
+          <p:cNvPr id="8" name="Picture 7"/>
+          <p:cNvPicPr>
+            <a:picLocks noChangeAspect="1"/>
+          </p:cNvPicPr>
+          <p:nvPr/>
+        </p:nvPicPr>
+        <p:blipFill>
+          <a:blip r:embed="rId4"/>
+          <a:stretch>
+            <a:fillRect/>
+          </a:stretch>
+        </p:blipFill>
+        <p:spPr>
+          <a:xfrm>
+            <a:off x="2228854" y="1244374"/>
+            <a:ext cx="209122" cy="472460"/>
+          </a:xfrm>
+          <a:prstGeom prst="rect">
+            <a:avLst/>
+          </a:prstGeom>
+        </p:spPr>
+      </p:pic>
+      <p:pic>
+        <p:nvPicPr>
+          <p:cNvPr id="10" name="Picture 9"/>
+          <p:cNvPicPr>
+            <a:picLocks noChangeAspect="1"/>
+          </p:cNvPicPr>
+          <p:nvPr/>
+        </p:nvPicPr>
+        <p:blipFill>
+          <a:blip r:embed="rId5"/>
+          <a:stretch>
+            <a:fillRect/>
+          </a:stretch>
+        </p:blipFill>
+        <p:spPr>
+          <a:xfrm>
+            <a:off x="8971050" y="5813667"/>
+            <a:ext cx="549285" cy="189573"/>
+          </a:xfrm>
+          <a:prstGeom prst="rect">
+            <a:avLst/>
+          </a:prstGeom>
+        </p:spPr>
+      </p:pic>
+    </p:spTree>
+    <p:extLst>
+      <p:ext uri="{BB962C8B-B14F-4D97-AF65-F5344CB8AC3E}">
+        <p14:creationId xmlns:p14="http://schemas.microsoft.com/office/powerpoint/2010/main" val="2604188727"/>
+      </p:ext>
+    </p:extLst>
+  </p:cSld>
+  <p:clrMapOvr>
+    <a:masterClrMapping/>
+  </p:clrMapOvr>
+</p:sld>
+</file>
+
+<file path=ppt/slides/slide13.xml><?xml version="1.0" encoding="utf-8"?>
+<p:sld xmlns:a="http://schemas.openxmlformats.org/drawingml/2006/main" xmlns:r="http://schemas.openxmlformats.org/officeDocument/2006/relationships" xmlns:p="http://schemas.openxmlformats.org/presentationml/2006/main">
+  <p:cSld>
+    <p:spTree>
+      <p:nvGrpSpPr>
+        <p:cNvPr id="1" name=""/>
+        <p:cNvGrpSpPr/>
+        <p:nvPr/>
+      </p:nvGrpSpPr>
+      <p:grpSpPr>
+        <a:xfrm>
+          <a:off x="0" y="0"/>
+          <a:ext cx="0" cy="0"/>
+          <a:chOff x="0" y="0"/>
+          <a:chExt cx="0" cy="0"/>
+        </a:xfrm>
+      </p:grpSpPr>
+      <p:sp>
+        <p:nvSpPr>
+          <p:cNvPr id="2" name="Date Placeholder 1"/>
+          <p:cNvSpPr>
+            <a:spLocks noGrp="1"/>
+          </p:cNvSpPr>
+          <p:nvPr>
+            <p:ph type="dt" sz="half" idx="10"/>
+          </p:nvPr>
+        </p:nvSpPr>
+        <p:spPr/>
+        <p:txBody>
+          <a:bodyPr/>
+          <a:lstStyle/>
+          <a:p>
+            <a:fld id="{482AA653-8872-4AEA-B19D-0BF0F1064A5A}" type="datetime3">
+              <a:rPr lang="en-US" smtClean="0"/>
+              <a:t>29 May 2019</a:t>
+            </a:fld>
+            <a:endParaRPr lang="en-US"/>
+          </a:p>
+        </p:txBody>
+      </p:sp>
+      <p:sp>
+        <p:nvSpPr>
+          <p:cNvPr id="3" name="Footer Placeholder 2"/>
+          <p:cNvSpPr>
+            <a:spLocks noGrp="1"/>
+          </p:cNvSpPr>
+          <p:nvPr>
+            <p:ph type="ftr" sz="quarter" idx="11"/>
+          </p:nvPr>
+        </p:nvSpPr>
+        <p:spPr/>
+        <p:txBody>
+          <a:bodyPr/>
+          <a:lstStyle/>
+          <a:p>
+            <a:r>
+              <a:rPr lang="fi-FI"/>
+              <a:t>NTUA, G. Bakas</a:t>
+            </a:r>
+            <a:endParaRPr lang="en-US"/>
+          </a:p>
+        </p:txBody>
+      </p:sp>
+      <p:sp>
+        <p:nvSpPr>
+          <p:cNvPr id="6" name="Slide Number Placeholder 5"/>
+          <p:cNvSpPr>
+            <a:spLocks noGrp="1"/>
+          </p:cNvSpPr>
+          <p:nvPr>
+            <p:ph type="sldNum" sz="quarter" idx="12"/>
+          </p:nvPr>
+        </p:nvSpPr>
+        <p:spPr/>
+        <p:txBody>
+          <a:bodyPr/>
+          <a:lstStyle/>
+          <a:p>
+            <a:fld id="{AEEFAC8D-0A19-DC49-9F7A-4BFCAD95B105}" type="slidenum">
+              <a:rPr lang="en-US" smtClean="0"/>
+              <a:t>13</a:t>
             </a:fld>
             <a:endParaRPr lang="en-US"/>
           </a:p>
@@ -5600,19 +6538,19 @@
           <a:lstStyle/>
           <a:p>
             <a:r>
-              <a:rPr lang="en-GB" u="sng" dirty="0" smtClean="0"/>
+              <a:rPr lang="en-GB" u="sng" dirty="0"/>
               <a:t>Comparisons with ATLAS </a:t>
             </a:r>
             <a:r>
-              <a:rPr lang="en-US" u="sng" dirty="0" smtClean="0"/>
+              <a:rPr lang="en-US" u="sng" dirty="0"/>
               <a:t>|cos</a:t>
             </a:r>
             <a:r>
-              <a:rPr lang="el-GR" u="sng" dirty="0" smtClean="0"/>
+              <a:rPr lang="el-GR" u="sng" dirty="0"/>
               <a:t>θ</a:t>
             </a:r>
             <a:r>
-              <a:rPr lang="fr-CH" u="sng" dirty="0" smtClean="0"/>
+              <a:rPr lang="fr-CH" u="sng" dirty="0"/>
               <a:t>| distributions</a:t>
             </a:r>
             <a:endParaRPr lang="en-GB" u="sng" dirty="0"/>
@@ -5686,7 +6624,7 @@
 </p:sld>
 </file>
 
-<file path=ppt/slides/slide11.xml><?xml version="1.0" encoding="utf-8"?>
+<file path=ppt/slides/slide14.xml><?xml version="1.0" encoding="utf-8"?>
 <p:sld xmlns:a="http://schemas.openxmlformats.org/drawingml/2006/main" xmlns:r="http://schemas.openxmlformats.org/officeDocument/2006/relationships" xmlns:p="http://schemas.openxmlformats.org/presentationml/2006/main">
   <p:cSld>
     <p:spTree>
@@ -5720,7 +6658,7 @@
           <a:p>
             <a:fld id="{482AA653-8872-4AEA-B19D-0BF0F1064A5A}" type="datetime3">
               <a:rPr lang="en-US" smtClean="0"/>
-              <a:t>28 May 2019</a:t>
+              <a:t>29 May 2019</a:t>
             </a:fld>
             <a:endParaRPr lang="en-US"/>
           </a:p>
@@ -5766,7 +6704,7 @@
           <a:p>
             <a:fld id="{AEEFAC8D-0A19-DC49-9F7A-4BFCAD95B105}" type="slidenum">
               <a:rPr lang="en-US" smtClean="0"/>
-              <a:t>11</a:t>
+              <a:t>14</a:t>
             </a:fld>
             <a:endParaRPr lang="en-US"/>
           </a:p>
@@ -5795,7 +6733,7 @@
           <a:lstStyle/>
           <a:p>
             <a:r>
-              <a:rPr lang="en-GB" u="sng" dirty="0" smtClean="0"/>
+              <a:rPr lang="en-GB" u="sng" dirty="0"/>
               <a:t>Comparisons with ATLAS </a:t>
             </a:r>
             <a:r>
@@ -5803,7 +6741,7 @@
               <a:t>χ</a:t>
             </a:r>
             <a:r>
-              <a:rPr lang="fr-CH" u="sng" dirty="0" smtClean="0"/>
+              <a:rPr lang="fr-CH" u="sng" dirty="0"/>
               <a:t> distributions</a:t>
             </a:r>
             <a:endParaRPr lang="en-GB" u="sng" dirty="0"/>
@@ -5877,7 +6815,7 @@
 </p:sld>
 </file>
 
-<file path=ppt/slides/slide12.xml><?xml version="1.0" encoding="utf-8"?>
+<file path=ppt/slides/slide15.xml><?xml version="1.0" encoding="utf-8"?>
 <p:sld xmlns:a="http://schemas.openxmlformats.org/drawingml/2006/main" xmlns:r="http://schemas.openxmlformats.org/officeDocument/2006/relationships" xmlns:p="http://schemas.openxmlformats.org/presentationml/2006/main">
   <p:cSld>
     <p:spTree>
@@ -5911,7 +6849,7 @@
           <a:p>
             <a:fld id="{482AA653-8872-4AEA-B19D-0BF0F1064A5A}" type="datetime3">
               <a:rPr lang="en-US" smtClean="0"/>
-              <a:t>28 May 2019</a:t>
+              <a:t>29 May 2019</a:t>
             </a:fld>
             <a:endParaRPr lang="en-US"/>
           </a:p>
@@ -5957,7 +6895,7 @@
           <a:p>
             <a:fld id="{AEEFAC8D-0A19-DC49-9F7A-4BFCAD95B105}" type="slidenum">
               <a:rPr lang="en-US" smtClean="0"/>
-              <a:t>12</a:t>
+              <a:t>15</a:t>
             </a:fld>
             <a:endParaRPr lang="en-US"/>
           </a:p>
@@ -5986,15 +6924,15 @@
           <a:lstStyle/>
           <a:p>
             <a:r>
-              <a:rPr lang="en-GB" u="sng" dirty="0" smtClean="0"/>
+              <a:rPr lang="en-GB" u="sng" dirty="0"/>
               <a:t>Comparison on how to measure </a:t>
             </a:r>
             <a:r>
-              <a:rPr lang="fr-CH" u="sng" dirty="0" smtClean="0"/>
+              <a:rPr lang="fr-CH" u="sng" dirty="0"/>
               <a:t>x </a:t>
             </a:r>
             <a:r>
-              <a:rPr lang="en-US" u="sng" dirty="0" smtClean="0"/>
+              <a:rPr lang="en-US" u="sng" dirty="0"/>
               <a:t>value</a:t>
             </a:r>
             <a:endParaRPr lang="en-GB" u="sng" dirty="0"/>
@@ -6031,8 +6969,8 @@
           </a:prstGeom>
         </p:spPr>
       </p:pic>
-      <mc:AlternateContent xmlns:mc="http://schemas.openxmlformats.org/markup-compatibility/2006">
-        <mc:Choice xmlns:a14="http://schemas.microsoft.com/office/drawing/2010/main" Requires="a14">
+      <mc:AlternateContent xmlns:mc="http://schemas.openxmlformats.org/markup-compatibility/2006" xmlns:a14="http://schemas.microsoft.com/office/drawing/2010/main">
+        <mc:Choice Requires="a14">
           <p:sp>
             <p:nvSpPr>
               <p:cNvPr id="9" name="TextBox 8"/>
@@ -6126,7 +7064,7 @@
                     </m:sSup>
                   </m:oMath>
                 </a14:m>
-                <a:endParaRPr lang="en-US" b="0" dirty="0" smtClean="0"/>
+                <a:endParaRPr lang="en-US" b="0" dirty="0"/>
               </a:p>
               <a:p>
                 <a:pPr marL="285750" indent="-285750">
@@ -6268,7 +7206,7 @@
                   <a:buFont typeface="Arial" panose="020B0604020202020204" pitchFamily="34" charset="0"/>
                   <a:buChar char="•"/>
                 </a:pPr>
-                <a:endParaRPr lang="en-US" b="0" dirty="0" smtClean="0"/>
+                <a:endParaRPr lang="en-US" b="0" dirty="0"/>
               </a:p>
               <a:p>
                 <a:pPr marL="285750" indent="-285750">
@@ -6276,14 +7214,14 @@
                   <a:buChar char="•"/>
                 </a:pPr>
                 <a:r>
-                  <a:rPr lang="en-US" dirty="0" smtClean="0">
+                  <a:rPr lang="en-US" dirty="0">
                     <a:solidFill>
                       <a:srgbClr val="FF0000"/>
                     </a:solidFill>
                   </a:rPr>
                   <a:t>No difference </a:t>
                 </a:r>
-                <a:endParaRPr lang="en-US" b="0" dirty="0" smtClean="0">
+                <a:endParaRPr lang="en-US" b="0" dirty="0">
                   <a:solidFill>
                     <a:srgbClr val="FF0000"/>
                   </a:solidFill>
@@ -6294,7 +7232,7 @@
                   <a:buFont typeface="Arial" panose="020B0604020202020204" pitchFamily="34" charset="0"/>
                   <a:buChar char="•"/>
                 </a:pPr>
-                <a:endParaRPr lang="en-US" dirty="0" smtClean="0"/>
+                <a:endParaRPr lang="en-US" dirty="0"/>
               </a:p>
               <a:p>
                 <a:pPr marL="285750" indent="-285750">
@@ -6306,7 +7244,7 @@
             </p:txBody>
           </p:sp>
         </mc:Choice>
-        <mc:Fallback>
+        <mc:Fallback xmlns="">
           <p:sp>
             <p:nvSpPr>
               <p:cNvPr id="9" name="TextBox 8"/>
@@ -6358,7 +7296,7 @@
 </p:sld>
 </file>
 
-<file path=ppt/slides/slide13.xml><?xml version="1.0" encoding="utf-8"?>
+<file path=ppt/slides/slide16.xml><?xml version="1.0" encoding="utf-8"?>
 <p:sld xmlns:a="http://schemas.openxmlformats.org/drawingml/2006/main" xmlns:r="http://schemas.openxmlformats.org/officeDocument/2006/relationships" xmlns:p="http://schemas.openxmlformats.org/presentationml/2006/main">
   <p:cSld>
     <p:spTree>
@@ -6392,7 +7330,7 @@
           <a:p>
             <a:fld id="{482AA653-8872-4AEA-B19D-0BF0F1064A5A}" type="datetime3">
               <a:rPr lang="en-US" smtClean="0"/>
-              <a:t>28 May 2019</a:t>
+              <a:t>29 May 2019</a:t>
             </a:fld>
             <a:endParaRPr lang="en-US"/>
           </a:p>
@@ -6438,7 +7376,7 @@
           <a:p>
             <a:fld id="{AEEFAC8D-0A19-DC49-9F7A-4BFCAD95B105}" type="slidenum">
               <a:rPr lang="en-US" smtClean="0"/>
-              <a:t>13</a:t>
+              <a:t>16</a:t>
             </a:fld>
             <a:endParaRPr lang="en-US"/>
           </a:p>
@@ -6467,7 +7405,7 @@
           <a:lstStyle/>
           <a:p>
             <a:r>
-              <a:rPr lang="en-US" u="sng" dirty="0" smtClean="0"/>
+              <a:rPr lang="en-US" u="sng" dirty="0"/>
               <a:t>QCD Measurement vs Search</a:t>
             </a:r>
             <a:endParaRPr lang="en-GB" u="sng" dirty="0"/>
@@ -6501,22 +7439,21 @@
               <a:buChar char="•"/>
             </a:pPr>
             <a:r>
-              <a:rPr lang="en-US" sz="1400" dirty="0" smtClean="0"/>
+              <a:rPr lang="en-US" sz="1400" dirty="0"/>
               <a:t>In exotica searches, an |</a:t>
             </a:r>
             <a:r>
-              <a:rPr lang="en-US" sz="1400" dirty="0" err="1" smtClean="0"/>
+              <a:rPr lang="en-US" sz="1400" dirty="0" err="1"/>
               <a:t>y</a:t>
             </a:r>
             <a:r>
-              <a:rPr lang="en-US" sz="1400" baseline="-25000" dirty="0" err="1" smtClean="0"/>
+              <a:rPr lang="en-US" sz="1400" baseline="-25000" dirty="0" err="1"/>
               <a:t>Boost</a:t>
             </a:r>
             <a:r>
-              <a:rPr lang="en-US" sz="1400" dirty="0" smtClean="0"/>
+              <a:rPr lang="en-US" sz="1400" dirty="0"/>
               <a:t>|&lt;1.19 cut is applied</a:t>
             </a:r>
-            <a:endParaRPr lang="en-US" sz="1400" dirty="0"/>
           </a:p>
           <a:p>
             <a:pPr marL="285750" indent="-285750">
@@ -6524,15 +7461,15 @@
               <a:buChar char="•"/>
             </a:pPr>
             <a:r>
-              <a:rPr lang="en-US" sz="1400" dirty="0" smtClean="0"/>
+              <a:rPr lang="en-US" sz="1400" dirty="0"/>
               <a:t>Are there any differences when we don’t </a:t>
             </a:r>
             <a:r>
-              <a:rPr lang="en-US" sz="1400" dirty="0" err="1" smtClean="0"/>
+              <a:rPr lang="en-US" sz="1400" dirty="0" err="1"/>
               <a:t>aply</a:t>
             </a:r>
             <a:r>
-              <a:rPr lang="en-US" sz="1400" dirty="0" smtClean="0"/>
+              <a:rPr lang="en-US" sz="1400" dirty="0"/>
               <a:t> the cut?</a:t>
             </a:r>
           </a:p>
@@ -6861,14 +7798,13 @@
           <a:lstStyle/>
           <a:p>
             <a:r>
-              <a:rPr lang="el-GR" sz="1000" dirty="0" smtClean="0"/>
+              <a:rPr lang="el-GR" sz="1000" dirty="0"/>
               <a:t>χ </a:t>
             </a:r>
             <a:r>
-              <a:rPr lang="en-GB" sz="1000" dirty="0" smtClean="0"/>
+              <a:rPr lang="en-GB" sz="1000" dirty="0"/>
               <a:t>With boost cut </a:t>
             </a:r>
-            <a:endParaRPr lang="en-GB" sz="1000" dirty="0"/>
           </a:p>
         </p:txBody>
       </p:sp>
@@ -6895,11 +7831,11 @@
           <a:lstStyle/>
           <a:p>
             <a:r>
-              <a:rPr lang="en-GB" sz="1000" dirty="0" smtClean="0"/>
+              <a:rPr lang="en-GB" sz="1000" dirty="0"/>
               <a:t>|cos</a:t>
             </a:r>
             <a:r>
-              <a:rPr lang="el-GR" sz="1000" dirty="0" smtClean="0"/>
+              <a:rPr lang="el-GR" sz="1000" dirty="0"/>
               <a:t>θ</a:t>
             </a:r>
             <a:r>
@@ -6907,14 +7843,13 @@
               <a:t>|</a:t>
             </a:r>
             <a:r>
-              <a:rPr lang="el-GR" sz="1000" dirty="0" smtClean="0"/>
+              <a:rPr lang="el-GR" sz="1000" dirty="0"/>
               <a:t> </a:t>
             </a:r>
             <a:r>
-              <a:rPr lang="en-GB" sz="1000" dirty="0" smtClean="0"/>
+              <a:rPr lang="en-GB" sz="1000" dirty="0"/>
               <a:t>With boost cut</a:t>
             </a:r>
-            <a:endParaRPr lang="en-GB" sz="1000" dirty="0"/>
           </a:p>
         </p:txBody>
       </p:sp>
@@ -6941,15 +7876,15 @@
           <a:lstStyle/>
           <a:p>
             <a:r>
-              <a:rPr lang="en-GB" sz="1000" dirty="0" smtClean="0"/>
+              <a:rPr lang="en-GB" sz="1000" dirty="0"/>
               <a:t>|cos</a:t>
             </a:r>
             <a:r>
-              <a:rPr lang="el-GR" sz="1000" dirty="0" smtClean="0"/>
+              <a:rPr lang="el-GR" sz="1000" dirty="0"/>
               <a:t>θ</a:t>
             </a:r>
             <a:r>
-              <a:rPr lang="en-US" sz="1000" dirty="0" smtClean="0"/>
+              <a:rPr lang="en-US" sz="1000" dirty="0"/>
               <a:t>|</a:t>
             </a:r>
             <a:endParaRPr lang="en-GB" sz="1000" dirty="0"/>
@@ -6979,7 +7914,7 @@
           <a:lstStyle/>
           <a:p>
             <a:r>
-              <a:rPr lang="el-GR" sz="1000" dirty="0" smtClean="0"/>
+              <a:rPr lang="el-GR" sz="1000" dirty="0"/>
               <a:t>χ</a:t>
             </a:r>
             <a:endParaRPr lang="en-GB" sz="1000" dirty="0"/>
@@ -7033,7 +7968,7 @@
           <a:p>
             <a:fld id="{7E37C362-8B6B-44E6-96A6-D3578FE67DFA}" type="datetime3">
               <a:rPr lang="en-US" smtClean="0"/>
-              <a:t>28 May 2019</a:t>
+              <a:t>29 May 2019</a:t>
             </a:fld>
             <a:endParaRPr lang="en-US"/>
           </a:p>
@@ -7064,6 +7999,1514 @@
       </p:sp>
       <mc:AlternateContent xmlns:mc="http://schemas.openxmlformats.org/markup-compatibility/2006">
         <mc:Choice xmlns:a14="http://schemas.microsoft.com/office/drawing/2010/main" Requires="a14">
+          <p:sp>
+            <p:nvSpPr>
+              <p:cNvPr id="4" name="TextBox 3"/>
+              <p:cNvSpPr txBox="1"/>
+              <p:nvPr/>
+            </p:nvSpPr>
+            <p:spPr>
+              <a:xfrm>
+                <a:off x="346842" y="717331"/>
+                <a:ext cx="11633664" cy="4770537"/>
+              </a:xfrm>
+              <a:prstGeom prst="rect">
+                <a:avLst/>
+              </a:prstGeom>
+              <a:noFill/>
+            </p:spPr>
+            <p:txBody>
+              <a:bodyPr wrap="square" rtlCol="0">
+                <a:spAutoFit/>
+              </a:bodyPr>
+              <a:lstStyle/>
+              <a:p>
+                <a:pPr marL="285750" indent="-285750">
+                  <a:buFont typeface="Arial" panose="020B0604020202020204" pitchFamily="34" charset="0"/>
+                  <a:buChar char="•"/>
+                </a:pPr>
+                <a:r>
+                  <a:rPr lang="en-US" sz="1600" dirty="0"/>
+                  <a:t>Motivation:</a:t>
+                </a:r>
+              </a:p>
+              <a:p>
+                <a:pPr marL="742950" lvl="1" indent="-285750">
+                  <a:buFont typeface="Arial" panose="020B0604020202020204" pitchFamily="34" charset="0"/>
+                  <a:buChar char="•"/>
+                </a:pPr>
+                <a:r>
+                  <a:rPr lang="en-US" sz="1600" dirty="0"/>
+                  <a:t>Additional U(1)’ gauge symmetries and associated Z’ gauge bosons are one of the most motivated extensions of the SM</a:t>
+                </a:r>
+              </a:p>
+              <a:p>
+                <a:pPr marL="742950" lvl="1" indent="-285750">
+                  <a:buFont typeface="Arial" panose="020B0604020202020204" pitchFamily="34" charset="0"/>
+                  <a:buChar char="•"/>
+                </a:pPr>
+                <a:r>
+                  <a:rPr lang="en-US" sz="1600" dirty="0"/>
+                  <a:t>It is more difficult to reduce the rank of an extended gauge group that contains the SM, than to break the non-abelian factors</a:t>
+                </a:r>
+              </a:p>
+              <a:p>
+                <a:endParaRPr lang="en-GB" sz="1600" dirty="0"/>
+              </a:p>
+              <a:p>
+                <a:pPr marL="285750" indent="-285750">
+                  <a:buFont typeface="Arial" panose="020B0604020202020204" pitchFamily="34" charset="0"/>
+                  <a:buChar char="•"/>
+                </a:pPr>
+                <a:r>
+                  <a:rPr lang="en-GB" sz="1600" dirty="0"/>
+                  <a:t>In the SM the neutral current interactions of the fermions are described by the </a:t>
+                </a:r>
+                <a:r>
+                  <a:rPr lang="en-GB" sz="1600" dirty="0" err="1"/>
+                  <a:t>Lagrangian</a:t>
+                </a:r>
+                <a:r>
+                  <a:rPr lang="en-GB" sz="1600" dirty="0"/>
+                  <a:t>:</a:t>
+                </a:r>
+                <a:endParaRPr lang="el-GR" sz="1600" dirty="0"/>
+              </a:p>
+              <a:p>
+                <a:pPr lvl="3"/>
+                <a:endParaRPr lang="el-GR" sz="1600" dirty="0"/>
+              </a:p>
+              <a:p>
+                <a:pPr marL="285750" indent="-285750">
+                  <a:buFont typeface="Arial" panose="020B0604020202020204" pitchFamily="34" charset="0"/>
+                  <a:buChar char="•"/>
+                </a:pPr>
+                <a:endParaRPr lang="en-US" sz="1600" dirty="0"/>
+              </a:p>
+              <a:p>
+                <a:pPr marL="285750" indent="-285750">
+                  <a:buFont typeface="Arial" panose="020B0604020202020204" pitchFamily="34" charset="0"/>
+                  <a:buChar char="•"/>
+                </a:pPr>
+                <a:endParaRPr lang="en-US" sz="1600" dirty="0"/>
+              </a:p>
+              <a:p>
+                <a:pPr marL="285750" indent="-285750">
+                  <a:buFont typeface="Arial" panose="020B0604020202020204" pitchFamily="34" charset="0"/>
+                  <a:buChar char="•"/>
+                </a:pPr>
+                <a:r>
+                  <a:rPr lang="en-US" sz="1600" dirty="0"/>
+                  <a:t>In the extension to SU(2) x U(1)</a:t>
+                </a:r>
+                <a:r>
+                  <a:rPr lang="en-US" sz="1600" baseline="-25000" dirty="0"/>
+                  <a:t>Y</a:t>
+                </a:r>
+                <a:r>
+                  <a:rPr lang="en-US" sz="1600" dirty="0"/>
+                  <a:t> x U(1) ‘</a:t>
+                </a:r>
+                <a:r>
+                  <a:rPr lang="en-US" sz="1600" baseline="30000" dirty="0"/>
+                  <a:t>n</a:t>
+                </a:r>
+                <a:r>
+                  <a:rPr lang="en-US" sz="1600" dirty="0"/>
+                  <a:t> , n </a:t>
+                </a:r>
+                <a14:m>
+                  <m:oMath xmlns:m="http://schemas.openxmlformats.org/officeDocument/2006/math">
+                    <m:r>
+                      <a:rPr lang="en-US" sz="1600" b="0" i="1" smtClean="0">
+                        <a:latin typeface="Cambria Math" panose="02040503050406030204" pitchFamily="18" charset="0"/>
+                      </a:rPr>
+                      <m:t>≥1 </m:t>
+                    </m:r>
+                  </m:oMath>
+                </a14:m>
+                <a:endParaRPr lang="en-GB" sz="1600" b="0" dirty="0"/>
+              </a:p>
+              <a:p>
+                <a:pPr marL="285750" indent="-285750">
+                  <a:buFont typeface="Arial" panose="020B0604020202020204" pitchFamily="34" charset="0"/>
+                  <a:buChar char="•"/>
+                </a:pPr>
+                <a:endParaRPr lang="en-GB" sz="1600" dirty="0"/>
+              </a:p>
+              <a:p>
+                <a:pPr marL="285750" indent="-285750">
+                  <a:buFont typeface="Arial" panose="020B0604020202020204" pitchFamily="34" charset="0"/>
+                  <a:buChar char="•"/>
+                </a:pPr>
+                <a:endParaRPr lang="en-GB" sz="1600" b="0" dirty="0"/>
+              </a:p>
+              <a:p>
+                <a:pPr marL="285750" indent="-285750">
+                  <a:buFont typeface="Arial" panose="020B0604020202020204" pitchFamily="34" charset="0"/>
+                  <a:buChar char="•"/>
+                </a:pPr>
+                <a:endParaRPr lang="en-GB" sz="1600" dirty="0"/>
+              </a:p>
+              <a:p>
+                <a:pPr marL="285750" indent="-285750">
+                  <a:buFont typeface="Arial" panose="020B0604020202020204" pitchFamily="34" charset="0"/>
+                  <a:buChar char="•"/>
+                </a:pPr>
+                <a:endParaRPr lang="en-GB" sz="1600" b="0" dirty="0"/>
+              </a:p>
+              <a:p>
+                <a:r>
+                  <a:rPr lang="en-GB" sz="1600" dirty="0"/>
+                  <a:t>	where g</a:t>
+                </a:r>
+                <a:r>
+                  <a:rPr lang="en-GB" sz="1600" baseline="-25000" dirty="0"/>
+                  <a:t>1</a:t>
+                </a:r>
+                <a:r>
+                  <a:rPr lang="en-GB" sz="1600" dirty="0"/>
+                  <a:t>, Z</a:t>
+                </a:r>
+                <a:r>
+                  <a:rPr lang="en-GB" sz="1600" baseline="-25000" dirty="0"/>
+                  <a:t>1</a:t>
+                </a:r>
+                <a:r>
+                  <a:rPr lang="el-GR" sz="1600" baseline="-25000" dirty="0"/>
+                  <a:t>μ</a:t>
+                </a:r>
+                <a:r>
+                  <a:rPr lang="el-GR" sz="1600" baseline="30000" dirty="0"/>
+                  <a:t>0 </a:t>
+                </a:r>
+                <a:r>
+                  <a:rPr lang="el-GR" sz="1600" baseline="-25000" dirty="0"/>
+                  <a:t> </a:t>
+                </a:r>
+                <a:r>
+                  <a:rPr lang="el-GR" sz="1600" dirty="0"/>
+                  <a:t> </a:t>
+                </a:r>
+                <a:r>
+                  <a:rPr lang="en-US" sz="1600" dirty="0"/>
+                  <a:t>and J</a:t>
+                </a:r>
+                <a:r>
+                  <a:rPr lang="en-US" sz="1600" baseline="-25000" dirty="0"/>
+                  <a:t>1</a:t>
+                </a:r>
+                <a:r>
+                  <a:rPr lang="el-GR" sz="1600" baseline="30000" dirty="0"/>
+                  <a:t>μ</a:t>
+                </a:r>
+                <a:r>
+                  <a:rPr lang="en-US" sz="1600" baseline="30000" dirty="0"/>
+                  <a:t> </a:t>
+                </a:r>
+                <a:r>
+                  <a:rPr lang="en-US" sz="1600" baseline="-25000" dirty="0"/>
+                  <a:t> </a:t>
+                </a:r>
+                <a:r>
+                  <a:rPr lang="en-US" sz="1600" dirty="0"/>
+                  <a:t> are the respectively the gauge coupling, boson and current for the SM. In a similar way </a:t>
+                </a:r>
+                <a:r>
+                  <a:rPr lang="en-US" sz="1600" dirty="0" err="1"/>
+                  <a:t>g</a:t>
+                </a:r>
+                <a:r>
+                  <a:rPr lang="en-US" sz="1600" baseline="-25000" dirty="0" err="1"/>
+                  <a:t>a</a:t>
+                </a:r>
+                <a:r>
+                  <a:rPr lang="en-US" sz="1600" dirty="0"/>
+                  <a:t> , Z</a:t>
+                </a:r>
+                <a:r>
+                  <a:rPr lang="en-US" sz="1600" baseline="-25000" dirty="0"/>
+                  <a:t>a</a:t>
+                </a:r>
+                <a:r>
+                  <a:rPr lang="el-GR" sz="1600" baseline="-25000" dirty="0"/>
+                  <a:t>μ</a:t>
+                </a:r>
+                <a:r>
+                  <a:rPr lang="el-GR" sz="1600" baseline="30000" dirty="0"/>
+                  <a:t>0</a:t>
+                </a:r>
+                <a:r>
+                  <a:rPr lang="en-US" sz="1600" dirty="0"/>
+                  <a:t> for a=2,…n+1 are the gauge couplings and bosons for the additional U(1)’s. </a:t>
+                </a:r>
+              </a:p>
+              <a:p>
+                <a:endParaRPr lang="en-US" sz="1600" b="0" dirty="0"/>
+              </a:p>
+              <a:p>
+                <a:r>
+                  <a:rPr lang="en-US" sz="1600" dirty="0"/>
+                  <a:t>The gauge currents will become:</a:t>
+                </a:r>
+              </a:p>
+              <a:p>
+                <a:r>
+                  <a:rPr lang="en-US" sz="1600" b="0" dirty="0"/>
+                  <a:t>	</a:t>
+                </a:r>
+                <a:endParaRPr lang="en-GB" sz="1600" b="0" dirty="0"/>
+              </a:p>
+              <a:p>
+                <a:pPr lvl="1"/>
+                <a:endParaRPr lang="en-US" sz="1600" b="0" dirty="0"/>
+              </a:p>
+            </p:txBody>
+          </p:sp>
+        </mc:Choice>
+        <mc:Fallback>
+          <p:sp>
+            <p:nvSpPr>
+              <p:cNvPr id="4" name="TextBox 3"/>
+              <p:cNvSpPr txBox="1">
+                <a:spLocks noRot="1" noChangeAspect="1" noMove="1" noResize="1" noEditPoints="1" noAdjustHandles="1" noChangeArrowheads="1" noChangeShapeType="1" noTextEdit="1"/>
+              </p:cNvSpPr>
+              <p:nvPr/>
+            </p:nvSpPr>
+            <p:spPr>
+              <a:xfrm>
+                <a:off x="346842" y="717331"/>
+                <a:ext cx="11633664" cy="4770537"/>
+              </a:xfrm>
+              <a:prstGeom prst="rect">
+                <a:avLst/>
+              </a:prstGeom>
+              <a:blipFill>
+                <a:blip r:embed="rId3"/>
+                <a:stretch>
+                  <a:fillRect l="-218"/>
+                </a:stretch>
+              </a:blipFill>
+            </p:spPr>
+            <p:txBody>
+              <a:bodyPr/>
+              <a:lstStyle/>
+              <a:p>
+                <a:r>
+                  <a:rPr lang="en-US">
+                    <a:noFill/>
+                  </a:rPr>
+                  <a:t> </a:t>
+                </a:r>
+              </a:p>
+            </p:txBody>
+          </p:sp>
+        </mc:Fallback>
+      </mc:AlternateContent>
+      <p:sp>
+        <p:nvSpPr>
+          <p:cNvPr id="5" name="TextBox 4"/>
+          <p:cNvSpPr txBox="1"/>
+          <p:nvPr/>
+        </p:nvSpPr>
+        <p:spPr>
+          <a:xfrm>
+            <a:off x="260131" y="157656"/>
+            <a:ext cx="10846676" cy="369332"/>
+          </a:xfrm>
+          <a:prstGeom prst="rect">
+            <a:avLst/>
+          </a:prstGeom>
+          <a:noFill/>
+        </p:spPr>
+        <p:txBody>
+          <a:bodyPr wrap="square" rtlCol="0">
+            <a:spAutoFit/>
+          </a:bodyPr>
+          <a:lstStyle/>
+          <a:p>
+            <a:r>
+              <a:rPr lang="en-US" u="sng" dirty="0"/>
+              <a:t>Z prime physics</a:t>
+            </a:r>
+            <a:endParaRPr lang="en-GB" u="sng" dirty="0"/>
+          </a:p>
+        </p:txBody>
+      </p:sp>
+      <p:sp>
+        <p:nvSpPr>
+          <p:cNvPr id="6" name="Slide Number Placeholder 5"/>
+          <p:cNvSpPr>
+            <a:spLocks noGrp="1"/>
+          </p:cNvSpPr>
+          <p:nvPr>
+            <p:ph type="sldNum" sz="quarter" idx="12"/>
+          </p:nvPr>
+        </p:nvSpPr>
+        <p:spPr/>
+        <p:txBody>
+          <a:bodyPr/>
+          <a:lstStyle/>
+          <a:p>
+            <a:fld id="{AEEFAC8D-0A19-DC49-9F7A-4BFCAD95B105}" type="slidenum">
+              <a:rPr lang="en-US" smtClean="0"/>
+              <a:t>2</a:t>
+            </a:fld>
+            <a:endParaRPr lang="en-US"/>
+          </a:p>
+        </p:txBody>
+      </p:sp>
+      <p:pic>
+        <p:nvPicPr>
+          <p:cNvPr id="8" name="Picture 7">
+            <a:extLst>
+              <a:ext uri="{FF2B5EF4-FFF2-40B4-BE49-F238E27FC236}">
+                <a16:creationId xmlns:a16="http://schemas.microsoft.com/office/drawing/2014/main" id="{A4B3639E-AB85-DB42-A7DB-113C3D84185D}"/>
+              </a:ext>
+            </a:extLst>
+          </p:cNvPr>
+          <p:cNvPicPr>
+            <a:picLocks noChangeAspect="1"/>
+          </p:cNvPicPr>
+          <p:nvPr/>
+        </p:nvPicPr>
+        <p:blipFill>
+          <a:blip r:embed="rId4"/>
+          <a:stretch>
+            <a:fillRect/>
+          </a:stretch>
+        </p:blipFill>
+        <p:spPr>
+          <a:xfrm>
+            <a:off x="3852876" y="3028558"/>
+            <a:ext cx="3661186" cy="800884"/>
+          </a:xfrm>
+          <a:prstGeom prst="rect">
+            <a:avLst/>
+          </a:prstGeom>
+        </p:spPr>
+      </p:pic>
+      <p:pic>
+        <p:nvPicPr>
+          <p:cNvPr id="9" name="Picture 8">
+            <a:extLst>
+              <a:ext uri="{FF2B5EF4-FFF2-40B4-BE49-F238E27FC236}">
+                <a16:creationId xmlns:a16="http://schemas.microsoft.com/office/drawing/2014/main" id="{BFE1CCD9-8852-094C-8887-3966455BB289}"/>
+              </a:ext>
+            </a:extLst>
+          </p:cNvPr>
+          <p:cNvPicPr>
+            <a:picLocks noChangeAspect="1"/>
+          </p:cNvPicPr>
+          <p:nvPr/>
+        </p:nvPicPr>
+        <p:blipFill>
+          <a:blip r:embed="rId5"/>
+          <a:stretch>
+            <a:fillRect/>
+          </a:stretch>
+        </p:blipFill>
+        <p:spPr>
+          <a:xfrm>
+            <a:off x="3356157" y="2023766"/>
+            <a:ext cx="5041900" cy="622300"/>
+          </a:xfrm>
+          <a:prstGeom prst="rect">
+            <a:avLst/>
+          </a:prstGeom>
+        </p:spPr>
+      </p:pic>
+      <p:pic>
+        <p:nvPicPr>
+          <p:cNvPr id="10" name="Picture 9">
+            <a:extLst>
+              <a:ext uri="{FF2B5EF4-FFF2-40B4-BE49-F238E27FC236}">
+                <a16:creationId xmlns:a16="http://schemas.microsoft.com/office/drawing/2014/main" id="{84048BD0-7965-A340-89FC-C7FA48654714}"/>
+              </a:ext>
+            </a:extLst>
+          </p:cNvPr>
+          <p:cNvPicPr>
+            <a:picLocks noChangeAspect="1"/>
+          </p:cNvPicPr>
+          <p:nvPr/>
+        </p:nvPicPr>
+        <p:blipFill>
+          <a:blip r:embed="rId6"/>
+          <a:stretch>
+            <a:fillRect/>
+          </a:stretch>
+        </p:blipFill>
+        <p:spPr>
+          <a:xfrm>
+            <a:off x="3686185" y="4757618"/>
+            <a:ext cx="4064000" cy="1460500"/>
+          </a:xfrm>
+          <a:prstGeom prst="rect">
+            <a:avLst/>
+          </a:prstGeom>
+        </p:spPr>
+      </p:pic>
+    </p:spTree>
+    <p:extLst>
+      <p:ext uri="{BB962C8B-B14F-4D97-AF65-F5344CB8AC3E}">
+        <p14:creationId xmlns:p14="http://schemas.microsoft.com/office/powerpoint/2010/main" val="3410422071"/>
+      </p:ext>
+    </p:extLst>
+  </p:cSld>
+  <p:clrMapOvr>
+    <a:masterClrMapping/>
+  </p:clrMapOvr>
+</p:sld>
+</file>
+
+<file path=ppt/slides/slide3.xml><?xml version="1.0" encoding="utf-8"?>
+<p:sld xmlns:a="http://schemas.openxmlformats.org/drawingml/2006/main" xmlns:r="http://schemas.openxmlformats.org/officeDocument/2006/relationships" xmlns:p="http://schemas.openxmlformats.org/presentationml/2006/main">
+  <p:cSld>
+    <p:spTree>
+      <p:nvGrpSpPr>
+        <p:cNvPr id="1" name=""/>
+        <p:cNvGrpSpPr/>
+        <p:nvPr/>
+      </p:nvGrpSpPr>
+      <p:grpSpPr>
+        <a:xfrm>
+          <a:off x="0" y="0"/>
+          <a:ext cx="0" cy="0"/>
+          <a:chOff x="0" y="0"/>
+          <a:chExt cx="0" cy="0"/>
+        </a:xfrm>
+      </p:grpSpPr>
+      <p:sp>
+        <p:nvSpPr>
+          <p:cNvPr id="2" name="Date Placeholder 1"/>
+          <p:cNvSpPr>
+            <a:spLocks noGrp="1"/>
+          </p:cNvSpPr>
+          <p:nvPr>
+            <p:ph type="dt" sz="half" idx="10"/>
+          </p:nvPr>
+        </p:nvSpPr>
+        <p:spPr/>
+        <p:txBody>
+          <a:bodyPr/>
+          <a:lstStyle/>
+          <a:p>
+            <a:fld id="{7E37C362-8B6B-44E6-96A6-D3578FE67DFA}" type="datetime3">
+              <a:rPr lang="en-US" smtClean="0"/>
+              <a:t>29 May 2019</a:t>
+            </a:fld>
+            <a:endParaRPr lang="en-US"/>
+          </a:p>
+        </p:txBody>
+      </p:sp>
+      <p:sp>
+        <p:nvSpPr>
+          <p:cNvPr id="3" name="Footer Placeholder 2"/>
+          <p:cNvSpPr>
+            <a:spLocks noGrp="1"/>
+          </p:cNvSpPr>
+          <p:nvPr>
+            <p:ph type="ftr" sz="quarter" idx="11"/>
+          </p:nvPr>
+        </p:nvSpPr>
+        <p:spPr/>
+        <p:txBody>
+          <a:bodyPr/>
+          <a:lstStyle/>
+          <a:p>
+            <a:r>
+              <a:rPr lang="fi-FI"/>
+              <a:t>NTUA, G. Bakas</a:t>
+            </a:r>
+            <a:endParaRPr lang="en-US"/>
+          </a:p>
+        </p:txBody>
+      </p:sp>
+      <p:sp>
+        <p:nvSpPr>
+          <p:cNvPr id="4" name="TextBox 3"/>
+          <p:cNvSpPr txBox="1"/>
+          <p:nvPr/>
+        </p:nvSpPr>
+        <p:spPr>
+          <a:xfrm>
+            <a:off x="357597" y="717331"/>
+            <a:ext cx="11633664" cy="3785652"/>
+          </a:xfrm>
+          <a:prstGeom prst="rect">
+            <a:avLst/>
+          </a:prstGeom>
+          <a:noFill/>
+        </p:spPr>
+        <p:txBody>
+          <a:bodyPr wrap="square" rtlCol="0">
+            <a:spAutoFit/>
+          </a:bodyPr>
+          <a:lstStyle/>
+          <a:p>
+            <a:pPr marL="285750" indent="-285750">
+              <a:buFont typeface="Arial" panose="020B0604020202020204" pitchFamily="34" charset="0"/>
+              <a:buChar char="•"/>
+            </a:pPr>
+            <a:r>
+              <a:rPr lang="en-US" sz="1600" b="0" dirty="0"/>
+              <a:t>The chiral coupl</a:t>
+            </a:r>
+            <a:r>
+              <a:rPr lang="en-US" sz="1600" dirty="0"/>
+              <a:t>ings </a:t>
+            </a:r>
+            <a:r>
+              <a:rPr lang="en-US" sz="1600" dirty="0" err="1"/>
+              <a:t>e</a:t>
+            </a:r>
+            <a:r>
+              <a:rPr lang="en-US" sz="1600" baseline="-25000" dirty="0" err="1"/>
+              <a:t>L</a:t>
+            </a:r>
+            <a:r>
+              <a:rPr lang="en-US" sz="1600" dirty="0"/>
+              <a:t> , </a:t>
+            </a:r>
+            <a:r>
+              <a:rPr lang="en-US" sz="1600" dirty="0" err="1"/>
+              <a:t>e</a:t>
+            </a:r>
+            <a:r>
+              <a:rPr lang="en-US" sz="1600" baseline="-25000" dirty="0" err="1"/>
+              <a:t>R</a:t>
+            </a:r>
+            <a:r>
+              <a:rPr lang="en-US" sz="1600" baseline="-25000" dirty="0"/>
+              <a:t> </a:t>
+            </a:r>
+            <a:r>
+              <a:rPr lang="en-US" sz="1600" dirty="0"/>
+              <a:t> are the U(1)</a:t>
+            </a:r>
+            <a:r>
+              <a:rPr lang="en-US" sz="1600" baseline="-25000" dirty="0"/>
+              <a:t>a</a:t>
+            </a:r>
+            <a:r>
+              <a:rPr lang="en-US" sz="1600" dirty="0"/>
+              <a:t> charges of the left and right handed components of the fermions and </a:t>
+            </a:r>
+            <a:r>
+              <a:rPr lang="en-US" sz="1600" dirty="0" err="1"/>
+              <a:t>g</a:t>
+            </a:r>
+            <a:r>
+              <a:rPr lang="en-US" sz="1600" baseline="-25000" dirty="0" err="1"/>
+              <a:t>V,A</a:t>
+            </a:r>
+            <a:r>
+              <a:rPr lang="en-US" sz="1600" baseline="-25000" dirty="0"/>
+              <a:t> </a:t>
+            </a:r>
+            <a:r>
+              <a:rPr lang="en-US" sz="1600" dirty="0"/>
+              <a:t> = </a:t>
+            </a:r>
+            <a:r>
+              <a:rPr lang="en-US" sz="1600" dirty="0" err="1"/>
+              <a:t>e</a:t>
+            </a:r>
+            <a:r>
+              <a:rPr lang="en-US" sz="1600" baseline="-25000" dirty="0" err="1"/>
+              <a:t>L</a:t>
+            </a:r>
+            <a:r>
+              <a:rPr lang="en-US" sz="1600" dirty="0"/>
+              <a:t> ± </a:t>
+            </a:r>
+            <a:r>
+              <a:rPr lang="en-US" sz="1600" dirty="0" err="1"/>
+              <a:t>e</a:t>
+            </a:r>
+            <a:r>
+              <a:rPr lang="en-US" sz="1600" baseline="-25000" dirty="0" err="1"/>
+              <a:t>R</a:t>
+            </a:r>
+            <a:r>
+              <a:rPr lang="en-US" sz="1600" baseline="-25000" dirty="0"/>
+              <a:t> </a:t>
+            </a:r>
+            <a:r>
+              <a:rPr lang="en-US" sz="1600" dirty="0"/>
+              <a:t> are the corresponding vector and axial couplings</a:t>
+            </a:r>
+          </a:p>
+          <a:p>
+            <a:pPr marL="285750" indent="-285750">
+              <a:buFont typeface="Arial" panose="020B0604020202020204" pitchFamily="34" charset="0"/>
+              <a:buChar char="•"/>
+            </a:pPr>
+            <a:endParaRPr lang="en-US" sz="1600" b="0" dirty="0"/>
+          </a:p>
+          <a:p>
+            <a:pPr marL="285750" indent="-285750">
+              <a:buFont typeface="Arial" panose="020B0604020202020204" pitchFamily="34" charset="0"/>
+              <a:buChar char="•"/>
+            </a:pPr>
+            <a:r>
+              <a:rPr lang="en-US" sz="1600" b="0" dirty="0"/>
+              <a:t>It is more conv</a:t>
+            </a:r>
+            <a:r>
+              <a:rPr lang="en-US" sz="1600" dirty="0"/>
+              <a:t>enient to specify the charges of the left chiral components of both the fermion  f and the antifermion f</a:t>
+            </a:r>
+            <a:r>
+              <a:rPr lang="en-US" sz="1600" baseline="30000" dirty="0"/>
+              <a:t>c </a:t>
+            </a:r>
+            <a:r>
+              <a:rPr lang="en-US" sz="1600" dirty="0"/>
+              <a:t> with </a:t>
+            </a:r>
+            <a:r>
+              <a:rPr lang="en-US" sz="1600" dirty="0" err="1"/>
+              <a:t>Q</a:t>
+            </a:r>
+            <a:r>
+              <a:rPr lang="en-US" sz="1600" baseline="-25000" dirty="0" err="1"/>
+              <a:t>af</a:t>
+            </a:r>
+            <a:r>
+              <a:rPr lang="en-US" sz="1600" dirty="0"/>
+              <a:t> , </a:t>
+            </a:r>
+            <a:r>
+              <a:rPr lang="en-US" sz="1600" dirty="0" err="1"/>
+              <a:t>Q</a:t>
+            </a:r>
+            <a:r>
+              <a:rPr lang="en-US" sz="1600" baseline="-25000" dirty="0" err="1"/>
+              <a:t>afc</a:t>
+            </a:r>
+            <a:r>
+              <a:rPr lang="en-US" sz="1600" baseline="-25000" dirty="0"/>
+              <a:t> </a:t>
+            </a:r>
+            <a:r>
+              <a:rPr lang="en-US" sz="1600" dirty="0"/>
+              <a:t> :</a:t>
+            </a:r>
+          </a:p>
+          <a:p>
+            <a:pPr marL="285750" indent="-285750">
+              <a:buFont typeface="Arial" panose="020B0604020202020204" pitchFamily="34" charset="0"/>
+              <a:buChar char="•"/>
+            </a:pPr>
+            <a:endParaRPr lang="en-US" sz="1600" dirty="0"/>
+          </a:p>
+          <a:p>
+            <a:pPr marL="285750" indent="-285750">
+              <a:buFont typeface="Arial" panose="020B0604020202020204" pitchFamily="34" charset="0"/>
+              <a:buChar char="•"/>
+            </a:pPr>
+            <a:endParaRPr lang="en-US" sz="1600" dirty="0"/>
+          </a:p>
+          <a:p>
+            <a:pPr marL="285750" indent="-285750">
+              <a:buFont typeface="Arial" panose="020B0604020202020204" pitchFamily="34" charset="0"/>
+              <a:buChar char="•"/>
+            </a:pPr>
+            <a:endParaRPr lang="en-US" sz="1600" dirty="0"/>
+          </a:p>
+          <a:p>
+            <a:pPr marL="285750" indent="-285750">
+              <a:buFont typeface="Arial" panose="020B0604020202020204" pitchFamily="34" charset="0"/>
+              <a:buChar char="•"/>
+            </a:pPr>
+            <a:r>
+              <a:rPr lang="en-US" sz="1600" dirty="0"/>
+              <a:t>For example in the SM one has:  					    and                                             </a:t>
+            </a:r>
+          </a:p>
+          <a:p>
+            <a:pPr marL="285750" indent="-285750">
+              <a:buFont typeface="Arial" panose="020B0604020202020204" pitchFamily="34" charset="0"/>
+              <a:buChar char="•"/>
+            </a:pPr>
+            <a:endParaRPr lang="en-US" sz="1600" b="0" dirty="0"/>
+          </a:p>
+          <a:p>
+            <a:pPr marL="285750" indent="-285750">
+              <a:buFont typeface="Arial" panose="020B0604020202020204" pitchFamily="34" charset="0"/>
+              <a:buChar char="•"/>
+            </a:pPr>
+            <a:r>
+              <a:rPr lang="en-US" sz="1600" dirty="0"/>
+              <a:t>The additional gauge couplings and charges are extremely model dependent</a:t>
+            </a:r>
+          </a:p>
+          <a:p>
+            <a:pPr marL="285750" indent="-285750">
+              <a:buFont typeface="Arial" panose="020B0604020202020204" pitchFamily="34" charset="0"/>
+              <a:buChar char="•"/>
+            </a:pPr>
+            <a:endParaRPr lang="en-US" sz="1600" b="0" dirty="0"/>
+          </a:p>
+          <a:p>
+            <a:pPr marL="285750" indent="-285750">
+              <a:buFont typeface="Arial" panose="020B0604020202020204" pitchFamily="34" charset="0"/>
+              <a:buChar char="•"/>
+            </a:pPr>
+            <a:r>
+              <a:rPr lang="en-US" sz="1600" dirty="0"/>
+              <a:t>The gauge covariant derivative will become:</a:t>
+            </a:r>
+          </a:p>
+          <a:p>
+            <a:pPr marL="285750" indent="-285750">
+              <a:buFont typeface="Arial" panose="020B0604020202020204" pitchFamily="34" charset="0"/>
+              <a:buChar char="•"/>
+            </a:pPr>
+            <a:endParaRPr lang="en-GB" sz="1600" b="0" dirty="0"/>
+          </a:p>
+          <a:p>
+            <a:pPr lvl="1"/>
+            <a:endParaRPr lang="en-GB" sz="1600" b="0" dirty="0"/>
+          </a:p>
+          <a:p>
+            <a:pPr lvl="1"/>
+            <a:r>
+              <a:rPr lang="en-GB" sz="1600" b="0" dirty="0"/>
+              <a:t>Where the q</a:t>
+            </a:r>
+            <a:r>
+              <a:rPr lang="en-GB" sz="1600" b="0" baseline="-25000" dirty="0"/>
+              <a:t>i </a:t>
+            </a:r>
+            <a:r>
+              <a:rPr lang="en-GB" sz="1600" b="0" dirty="0"/>
+              <a:t>, </a:t>
+            </a:r>
+            <a:r>
+              <a:rPr lang="en-GB" sz="1600" b="0" dirty="0" err="1"/>
+              <a:t>Q</a:t>
+            </a:r>
+            <a:r>
+              <a:rPr lang="en-GB" sz="1600" b="0" baseline="-25000" dirty="0" err="1"/>
+              <a:t>ai</a:t>
+            </a:r>
+            <a:r>
+              <a:rPr lang="en-GB" sz="1600" dirty="0"/>
+              <a:t> , are respectively the electric and U(1)</a:t>
+            </a:r>
+            <a:r>
+              <a:rPr lang="en-GB" sz="1600" baseline="-25000" dirty="0"/>
+              <a:t>a </a:t>
+            </a:r>
+            <a:r>
+              <a:rPr lang="en-GB" sz="1600" dirty="0"/>
+              <a:t> charges of the </a:t>
+            </a:r>
+            <a:r>
+              <a:rPr lang="el-GR" sz="1600" dirty="0"/>
+              <a:t>φ</a:t>
+            </a:r>
+            <a:r>
+              <a:rPr lang="en-US" sz="1600" baseline="-25000" dirty="0" err="1"/>
+              <a:t>i</a:t>
+            </a:r>
+            <a:endParaRPr lang="en-GB" sz="1600" b="0" dirty="0"/>
+          </a:p>
+        </p:txBody>
+      </p:sp>
+      <p:sp>
+        <p:nvSpPr>
+          <p:cNvPr id="5" name="TextBox 4"/>
+          <p:cNvSpPr txBox="1"/>
+          <p:nvPr/>
+        </p:nvSpPr>
+        <p:spPr>
+          <a:xfrm>
+            <a:off x="260131" y="157656"/>
+            <a:ext cx="10846676" cy="369332"/>
+          </a:xfrm>
+          <a:prstGeom prst="rect">
+            <a:avLst/>
+          </a:prstGeom>
+          <a:noFill/>
+        </p:spPr>
+        <p:txBody>
+          <a:bodyPr wrap="square" rtlCol="0">
+            <a:spAutoFit/>
+          </a:bodyPr>
+          <a:lstStyle/>
+          <a:p>
+            <a:r>
+              <a:rPr lang="en-US" u="sng" dirty="0"/>
+              <a:t>Z prime physics</a:t>
+            </a:r>
+            <a:endParaRPr lang="en-GB" u="sng" dirty="0"/>
+          </a:p>
+        </p:txBody>
+      </p:sp>
+      <p:sp>
+        <p:nvSpPr>
+          <p:cNvPr id="6" name="Slide Number Placeholder 5"/>
+          <p:cNvSpPr>
+            <a:spLocks noGrp="1"/>
+          </p:cNvSpPr>
+          <p:nvPr>
+            <p:ph type="sldNum" sz="quarter" idx="12"/>
+          </p:nvPr>
+        </p:nvSpPr>
+        <p:spPr/>
+        <p:txBody>
+          <a:bodyPr/>
+          <a:lstStyle/>
+          <a:p>
+            <a:fld id="{AEEFAC8D-0A19-DC49-9F7A-4BFCAD95B105}" type="slidenum">
+              <a:rPr lang="en-US" smtClean="0"/>
+              <a:t>3</a:t>
+            </a:fld>
+            <a:endParaRPr lang="en-US"/>
+          </a:p>
+        </p:txBody>
+      </p:sp>
+      <p:pic>
+        <p:nvPicPr>
+          <p:cNvPr id="7" name="Picture 6">
+            <a:extLst>
+              <a:ext uri="{FF2B5EF4-FFF2-40B4-BE49-F238E27FC236}">
+                <a16:creationId xmlns:a16="http://schemas.microsoft.com/office/drawing/2014/main" id="{4093280B-4E6F-D14D-B682-64B335AF1644}"/>
+              </a:ext>
+            </a:extLst>
+          </p:cNvPr>
+          <p:cNvPicPr>
+            <a:picLocks noChangeAspect="1"/>
+          </p:cNvPicPr>
+          <p:nvPr/>
+        </p:nvPicPr>
+        <p:blipFill>
+          <a:blip r:embed="rId3"/>
+          <a:stretch>
+            <a:fillRect/>
+          </a:stretch>
+        </p:blipFill>
+        <p:spPr>
+          <a:xfrm>
+            <a:off x="3651469" y="1984892"/>
+            <a:ext cx="4064000" cy="469900"/>
+          </a:xfrm>
+          <a:prstGeom prst="rect">
+            <a:avLst/>
+          </a:prstGeom>
+        </p:spPr>
+      </p:pic>
+      <p:pic>
+        <p:nvPicPr>
+          <p:cNvPr id="11" name="Picture 10">
+            <a:extLst>
+              <a:ext uri="{FF2B5EF4-FFF2-40B4-BE49-F238E27FC236}">
+                <a16:creationId xmlns:a16="http://schemas.microsoft.com/office/drawing/2014/main" id="{01B51CEA-C86B-0F4A-8AD1-865DBCCB66F3}"/>
+              </a:ext>
+            </a:extLst>
+          </p:cNvPr>
+          <p:cNvPicPr>
+            <a:picLocks noChangeAspect="1"/>
+          </p:cNvPicPr>
+          <p:nvPr/>
+        </p:nvPicPr>
+        <p:blipFill>
+          <a:blip r:embed="rId4"/>
+          <a:stretch>
+            <a:fillRect/>
+          </a:stretch>
+        </p:blipFill>
+        <p:spPr>
+          <a:xfrm>
+            <a:off x="3569551" y="2407563"/>
+            <a:ext cx="2032000" cy="419100"/>
+          </a:xfrm>
+          <a:prstGeom prst="rect">
+            <a:avLst/>
+          </a:prstGeom>
+        </p:spPr>
+      </p:pic>
+      <p:pic>
+        <p:nvPicPr>
+          <p:cNvPr id="12" name="Picture 11">
+            <a:extLst>
+              <a:ext uri="{FF2B5EF4-FFF2-40B4-BE49-F238E27FC236}">
+                <a16:creationId xmlns:a16="http://schemas.microsoft.com/office/drawing/2014/main" id="{3698C0B9-3776-014D-AE07-B08C5DFB8728}"/>
+              </a:ext>
+            </a:extLst>
+          </p:cNvPr>
+          <p:cNvPicPr>
+            <a:picLocks noChangeAspect="1"/>
+          </p:cNvPicPr>
+          <p:nvPr/>
+        </p:nvPicPr>
+        <p:blipFill>
+          <a:blip r:embed="rId5"/>
+          <a:stretch>
+            <a:fillRect/>
+          </a:stretch>
+        </p:blipFill>
+        <p:spPr>
+          <a:xfrm>
+            <a:off x="6096000" y="2439313"/>
+            <a:ext cx="1930400" cy="355600"/>
+          </a:xfrm>
+          <a:prstGeom prst="rect">
+            <a:avLst/>
+          </a:prstGeom>
+        </p:spPr>
+      </p:pic>
+      <p:pic>
+        <p:nvPicPr>
+          <p:cNvPr id="13" name="Picture 12">
+            <a:extLst>
+              <a:ext uri="{FF2B5EF4-FFF2-40B4-BE49-F238E27FC236}">
+                <a16:creationId xmlns:a16="http://schemas.microsoft.com/office/drawing/2014/main" id="{75DB37EF-263E-164B-8892-CFB42FA513F5}"/>
+              </a:ext>
+            </a:extLst>
+          </p:cNvPr>
+          <p:cNvPicPr>
+            <a:picLocks noChangeAspect="1"/>
+          </p:cNvPicPr>
+          <p:nvPr/>
+        </p:nvPicPr>
+        <p:blipFill>
+          <a:blip r:embed="rId6"/>
+          <a:stretch>
+            <a:fillRect/>
+          </a:stretch>
+        </p:blipFill>
+        <p:spPr>
+          <a:xfrm>
+            <a:off x="4585551" y="3225006"/>
+            <a:ext cx="4406900" cy="785534"/>
+          </a:xfrm>
+          <a:prstGeom prst="rect">
+            <a:avLst/>
+          </a:prstGeom>
+        </p:spPr>
+      </p:pic>
+    </p:spTree>
+    <p:extLst>
+      <p:ext uri="{BB962C8B-B14F-4D97-AF65-F5344CB8AC3E}">
+        <p14:creationId xmlns:p14="http://schemas.microsoft.com/office/powerpoint/2010/main" val="1058468078"/>
+      </p:ext>
+    </p:extLst>
+  </p:cSld>
+  <p:clrMapOvr>
+    <a:masterClrMapping/>
+  </p:clrMapOvr>
+</p:sld>
+</file>
+
+<file path=ppt/slides/slide4.xml><?xml version="1.0" encoding="utf-8"?>
+<p:sld xmlns:a="http://schemas.openxmlformats.org/drawingml/2006/main" xmlns:r="http://schemas.openxmlformats.org/officeDocument/2006/relationships" xmlns:p="http://schemas.openxmlformats.org/presentationml/2006/main">
+  <p:cSld>
+    <p:spTree>
+      <p:nvGrpSpPr>
+        <p:cNvPr id="1" name=""/>
+        <p:cNvGrpSpPr/>
+        <p:nvPr/>
+      </p:nvGrpSpPr>
+      <p:grpSpPr>
+        <a:xfrm>
+          <a:off x="0" y="0"/>
+          <a:ext cx="0" cy="0"/>
+          <a:chOff x="0" y="0"/>
+          <a:chExt cx="0" cy="0"/>
+        </a:xfrm>
+      </p:grpSpPr>
+      <p:sp>
+        <p:nvSpPr>
+          <p:cNvPr id="2" name="Date Placeholder 1"/>
+          <p:cNvSpPr>
+            <a:spLocks noGrp="1"/>
+          </p:cNvSpPr>
+          <p:nvPr>
+            <p:ph type="dt" sz="half" idx="10"/>
+          </p:nvPr>
+        </p:nvSpPr>
+        <p:spPr/>
+        <p:txBody>
+          <a:bodyPr/>
+          <a:lstStyle/>
+          <a:p>
+            <a:fld id="{7E37C362-8B6B-44E6-96A6-D3578FE67DFA}" type="datetime3">
+              <a:rPr lang="en-US" smtClean="0"/>
+              <a:t>29 May 2019</a:t>
+            </a:fld>
+            <a:endParaRPr lang="en-US"/>
+          </a:p>
+        </p:txBody>
+      </p:sp>
+      <p:sp>
+        <p:nvSpPr>
+          <p:cNvPr id="3" name="Footer Placeholder 2"/>
+          <p:cNvSpPr>
+            <a:spLocks noGrp="1"/>
+          </p:cNvSpPr>
+          <p:nvPr>
+            <p:ph type="ftr" sz="quarter" idx="11"/>
+          </p:nvPr>
+        </p:nvSpPr>
+        <p:spPr/>
+        <p:txBody>
+          <a:bodyPr/>
+          <a:lstStyle/>
+          <a:p>
+            <a:r>
+              <a:rPr lang="fi-FI"/>
+              <a:t>NTUA, G. Bakas</a:t>
+            </a:r>
+            <a:endParaRPr lang="en-US"/>
+          </a:p>
+        </p:txBody>
+      </p:sp>
+      <p:sp>
+        <p:nvSpPr>
+          <p:cNvPr id="5" name="TextBox 4"/>
+          <p:cNvSpPr txBox="1"/>
+          <p:nvPr/>
+        </p:nvSpPr>
+        <p:spPr>
+          <a:xfrm>
+            <a:off x="270888" y="157656"/>
+            <a:ext cx="11325855" cy="3847207"/>
+          </a:xfrm>
+          <a:prstGeom prst="rect">
+            <a:avLst/>
+          </a:prstGeom>
+          <a:noFill/>
+        </p:spPr>
+        <p:txBody>
+          <a:bodyPr wrap="square" rtlCol="0">
+            <a:spAutoFit/>
+          </a:bodyPr>
+          <a:lstStyle/>
+          <a:p>
+            <a:r>
+              <a:rPr lang="en-US" u="sng" dirty="0"/>
+              <a:t>Z prime physics-Masses and mass mixings</a:t>
+            </a:r>
+          </a:p>
+          <a:p>
+            <a:endParaRPr lang="en-GB" u="sng" dirty="0"/>
+          </a:p>
+          <a:p>
+            <a:pPr marL="285750" indent="-285750">
+              <a:buFont typeface="Arial" panose="020B0604020202020204" pitchFamily="34" charset="0"/>
+              <a:buChar char="•"/>
+            </a:pPr>
+            <a:r>
+              <a:rPr lang="en-US" sz="1600" dirty="0"/>
+              <a:t>We assume that the electrically neutral photon field is massless while the Z</a:t>
+            </a:r>
+            <a:r>
+              <a:rPr lang="en-US" sz="1600" baseline="-25000" dirty="0"/>
+              <a:t>a</a:t>
+            </a:r>
+            <a:r>
+              <a:rPr lang="el-GR" sz="1600" baseline="-25000" dirty="0"/>
+              <a:t>μ</a:t>
+            </a:r>
+            <a:r>
+              <a:rPr lang="el-GR" sz="1600" baseline="30000" dirty="0"/>
+              <a:t>0</a:t>
+            </a:r>
+            <a:r>
+              <a:rPr lang="el-GR" sz="1600" dirty="0"/>
+              <a:t> </a:t>
+            </a:r>
+            <a:r>
+              <a:rPr lang="en-US" sz="1600" dirty="0"/>
+              <a:t>develops a mass term                             </a:t>
+            </a:r>
+          </a:p>
+          <a:p>
+            <a:r>
+              <a:rPr lang="en-US" sz="1600" dirty="0"/>
+              <a:t>       Where </a:t>
+            </a:r>
+          </a:p>
+          <a:p>
+            <a:endParaRPr lang="en-US" sz="1600" dirty="0"/>
+          </a:p>
+          <a:p>
+            <a:endParaRPr lang="en-US" sz="1600" dirty="0"/>
+          </a:p>
+          <a:p>
+            <a:endParaRPr lang="en-US" sz="1600" dirty="0"/>
+          </a:p>
+          <a:p>
+            <a:pPr marL="285750" indent="-285750">
+              <a:buFont typeface="Arial" panose="020B0604020202020204" pitchFamily="34" charset="0"/>
+              <a:buChar char="•"/>
+            </a:pPr>
+            <a:r>
+              <a:rPr lang="en-US" sz="1600" dirty="0" err="1"/>
+              <a:t>Diagonilize</a:t>
+            </a:r>
+            <a:r>
+              <a:rPr lang="en-US" sz="1600" dirty="0"/>
+              <a:t> the mass matrix and one obtains n+1 massive eigenstates Z</a:t>
+            </a:r>
+            <a:r>
+              <a:rPr lang="el-GR" sz="1600" dirty="0" err="1"/>
+              <a:t>αμ</a:t>
+            </a:r>
+            <a:r>
+              <a:rPr lang="el-GR" sz="1600" dirty="0"/>
+              <a:t> </a:t>
+            </a:r>
+            <a:r>
+              <a:rPr lang="en-US" sz="1600" dirty="0"/>
+              <a:t> with</a:t>
+            </a:r>
+            <a:r>
+              <a:rPr lang="el-GR" sz="1600" dirty="0"/>
+              <a:t> </a:t>
+            </a:r>
+            <a:r>
+              <a:rPr lang="en-US" sz="1600" dirty="0"/>
+              <a:t>mass M</a:t>
+            </a:r>
+            <a:r>
+              <a:rPr lang="el-GR" sz="1600" baseline="-25000" dirty="0"/>
+              <a:t>α </a:t>
+            </a:r>
+            <a:r>
+              <a:rPr lang="el-GR" sz="1600" dirty="0"/>
+              <a:t> </a:t>
+            </a:r>
+            <a:r>
+              <a:rPr lang="en-US" sz="1600" dirty="0"/>
+              <a:t>:</a:t>
+            </a:r>
+          </a:p>
+          <a:p>
+            <a:pPr marL="285750" indent="-285750">
+              <a:buFont typeface="Arial" panose="020B0604020202020204" pitchFamily="34" charset="0"/>
+              <a:buChar char="•"/>
+            </a:pPr>
+            <a:endParaRPr lang="en-US" sz="1600" dirty="0"/>
+          </a:p>
+          <a:p>
+            <a:pPr marL="285750" indent="-285750">
+              <a:buFont typeface="Arial" panose="020B0604020202020204" pitchFamily="34" charset="0"/>
+              <a:buChar char="•"/>
+            </a:pPr>
+            <a:endParaRPr lang="en-US" sz="1600" dirty="0"/>
+          </a:p>
+          <a:p>
+            <a:pPr marL="285750" indent="-285750">
+              <a:buFont typeface="Arial" panose="020B0604020202020204" pitchFamily="34" charset="0"/>
+              <a:buChar char="•"/>
+            </a:pPr>
+            <a:endParaRPr lang="en-US" sz="1600" dirty="0"/>
+          </a:p>
+          <a:p>
+            <a:pPr marL="285750" indent="-285750">
+              <a:buFont typeface="Arial" panose="020B0604020202020204" pitchFamily="34" charset="0"/>
+              <a:buChar char="•"/>
+            </a:pPr>
+            <a:endParaRPr lang="en-US" sz="1600" dirty="0"/>
+          </a:p>
+          <a:p>
+            <a:pPr marL="285750" indent="-285750">
+              <a:buFont typeface="Arial" panose="020B0604020202020204" pitchFamily="34" charset="0"/>
+              <a:buChar char="•"/>
+            </a:pPr>
+            <a:endParaRPr lang="en-US" sz="1600" dirty="0"/>
+          </a:p>
+          <a:p>
+            <a:pPr marL="285750" indent="-285750">
+              <a:buFont typeface="Arial" panose="020B0604020202020204" pitchFamily="34" charset="0"/>
+              <a:buChar char="•"/>
+            </a:pPr>
+            <a:r>
+              <a:rPr lang="en-US" sz="1600" dirty="0"/>
+              <a:t>But Z</a:t>
+            </a:r>
+            <a:r>
+              <a:rPr lang="en-US" sz="1600" baseline="-25000" dirty="0"/>
+              <a:t>a</a:t>
+            </a:r>
+            <a:r>
+              <a:rPr lang="el-GR" sz="1600" baseline="-25000" dirty="0"/>
+              <a:t>μ </a:t>
+            </a:r>
+            <a:r>
+              <a:rPr lang="el-GR" sz="1600" dirty="0"/>
+              <a:t> </a:t>
+            </a:r>
+            <a:r>
+              <a:rPr lang="en-US" sz="1600" dirty="0"/>
+              <a:t>couples to                                and the most studied case is where n =1 and we get a mass matrix: </a:t>
+            </a:r>
+          </a:p>
+          <a:p>
+            <a:pPr marL="285750" indent="-285750">
+              <a:buFont typeface="Arial" panose="020B0604020202020204" pitchFamily="34" charset="0"/>
+              <a:buChar char="•"/>
+            </a:pPr>
+            <a:endParaRPr lang="en-US" sz="1600" dirty="0"/>
+          </a:p>
+        </p:txBody>
+      </p:sp>
+      <p:sp>
+        <p:nvSpPr>
+          <p:cNvPr id="6" name="Slide Number Placeholder 5"/>
+          <p:cNvSpPr>
+            <a:spLocks noGrp="1"/>
+          </p:cNvSpPr>
+          <p:nvPr>
+            <p:ph type="sldNum" sz="quarter" idx="12"/>
+          </p:nvPr>
+        </p:nvSpPr>
+        <p:spPr/>
+        <p:txBody>
+          <a:bodyPr/>
+          <a:lstStyle/>
+          <a:p>
+            <a:fld id="{AEEFAC8D-0A19-DC49-9F7A-4BFCAD95B105}" type="slidenum">
+              <a:rPr lang="en-US" smtClean="0"/>
+              <a:t>4</a:t>
+            </a:fld>
+            <a:endParaRPr lang="en-US"/>
+          </a:p>
+        </p:txBody>
+      </p:sp>
+      <p:pic>
+        <p:nvPicPr>
+          <p:cNvPr id="8" name="Picture 7">
+            <a:extLst>
+              <a:ext uri="{FF2B5EF4-FFF2-40B4-BE49-F238E27FC236}">
+                <a16:creationId xmlns:a16="http://schemas.microsoft.com/office/drawing/2014/main" id="{60CDAE33-B3DB-E945-8089-E334D7A89623}"/>
+              </a:ext>
+            </a:extLst>
+          </p:cNvPr>
+          <p:cNvPicPr>
+            <a:picLocks noChangeAspect="1"/>
+          </p:cNvPicPr>
+          <p:nvPr/>
+        </p:nvPicPr>
+        <p:blipFill>
+          <a:blip r:embed="rId3"/>
+          <a:stretch>
+            <a:fillRect/>
+          </a:stretch>
+        </p:blipFill>
+        <p:spPr>
+          <a:xfrm>
+            <a:off x="8913783" y="776186"/>
+            <a:ext cx="2298700" cy="304800"/>
+          </a:xfrm>
+          <a:prstGeom prst="rect">
+            <a:avLst/>
+          </a:prstGeom>
+        </p:spPr>
+      </p:pic>
+      <p:pic>
+        <p:nvPicPr>
+          <p:cNvPr id="9" name="Picture 8">
+            <a:extLst>
+              <a:ext uri="{FF2B5EF4-FFF2-40B4-BE49-F238E27FC236}">
+                <a16:creationId xmlns:a16="http://schemas.microsoft.com/office/drawing/2014/main" id="{C6216F4D-5CF9-2C41-96AC-E0210ECFDC73}"/>
+              </a:ext>
+            </a:extLst>
+          </p:cNvPr>
+          <p:cNvPicPr>
+            <a:picLocks noChangeAspect="1"/>
+          </p:cNvPicPr>
+          <p:nvPr/>
+        </p:nvPicPr>
+        <p:blipFill>
+          <a:blip r:embed="rId4"/>
+          <a:stretch>
+            <a:fillRect/>
+          </a:stretch>
+        </p:blipFill>
+        <p:spPr>
+          <a:xfrm>
+            <a:off x="4365365" y="1250551"/>
+            <a:ext cx="3136900" cy="584200"/>
+          </a:xfrm>
+          <a:prstGeom prst="rect">
+            <a:avLst/>
+          </a:prstGeom>
+        </p:spPr>
+      </p:pic>
+      <p:pic>
+        <p:nvPicPr>
+          <p:cNvPr id="10" name="Picture 9">
+            <a:extLst>
+              <a:ext uri="{FF2B5EF4-FFF2-40B4-BE49-F238E27FC236}">
+                <a16:creationId xmlns:a16="http://schemas.microsoft.com/office/drawing/2014/main" id="{B93705C6-1FE7-6E45-8B27-8AB2FA2E4E15}"/>
+              </a:ext>
+            </a:extLst>
+          </p:cNvPr>
+          <p:cNvPicPr>
+            <a:picLocks noChangeAspect="1"/>
+          </p:cNvPicPr>
+          <p:nvPr/>
+        </p:nvPicPr>
+        <p:blipFill>
+          <a:blip r:embed="rId5"/>
+          <a:stretch>
+            <a:fillRect/>
+          </a:stretch>
+        </p:blipFill>
+        <p:spPr>
+          <a:xfrm>
+            <a:off x="4828915" y="2325818"/>
+            <a:ext cx="2209800" cy="850900"/>
+          </a:xfrm>
+          <a:prstGeom prst="rect">
+            <a:avLst/>
+          </a:prstGeom>
+        </p:spPr>
+      </p:pic>
+      <p:pic>
+        <p:nvPicPr>
+          <p:cNvPr id="16" name="Picture 15">
+            <a:extLst>
+              <a:ext uri="{FF2B5EF4-FFF2-40B4-BE49-F238E27FC236}">
+                <a16:creationId xmlns:a16="http://schemas.microsoft.com/office/drawing/2014/main" id="{A276B9D6-A890-5447-AEB3-2C3255684D04}"/>
+              </a:ext>
+            </a:extLst>
+          </p:cNvPr>
+          <p:cNvPicPr>
+            <a:picLocks noChangeAspect="1"/>
+          </p:cNvPicPr>
+          <p:nvPr/>
+        </p:nvPicPr>
+        <p:blipFill>
+          <a:blip r:embed="rId6"/>
+          <a:stretch>
+            <a:fillRect/>
+          </a:stretch>
+        </p:blipFill>
+        <p:spPr>
+          <a:xfrm>
+            <a:off x="2185251" y="3429000"/>
+            <a:ext cx="1384300" cy="279400"/>
+          </a:xfrm>
+          <a:prstGeom prst="rect">
+            <a:avLst/>
+          </a:prstGeom>
+        </p:spPr>
+      </p:pic>
+      <p:pic>
+        <p:nvPicPr>
+          <p:cNvPr id="17" name="Picture 16">
+            <a:extLst>
+              <a:ext uri="{FF2B5EF4-FFF2-40B4-BE49-F238E27FC236}">
+                <a16:creationId xmlns:a16="http://schemas.microsoft.com/office/drawing/2014/main" id="{8D069CF2-FA57-C340-8DF5-7E7A50AB72FE}"/>
+              </a:ext>
+            </a:extLst>
+          </p:cNvPr>
+          <p:cNvPicPr>
+            <a:picLocks noChangeAspect="1"/>
+          </p:cNvPicPr>
+          <p:nvPr/>
+        </p:nvPicPr>
+        <p:blipFill>
+          <a:blip r:embed="rId7"/>
+          <a:stretch>
+            <a:fillRect/>
+          </a:stretch>
+        </p:blipFill>
+        <p:spPr>
+          <a:xfrm>
+            <a:off x="3095365" y="3845319"/>
+            <a:ext cx="5676900" cy="1244600"/>
+          </a:xfrm>
+          <a:prstGeom prst="rect">
+            <a:avLst/>
+          </a:prstGeom>
+        </p:spPr>
+      </p:pic>
+    </p:spTree>
+    <p:extLst>
+      <p:ext uri="{BB962C8B-B14F-4D97-AF65-F5344CB8AC3E}">
+        <p14:creationId xmlns:p14="http://schemas.microsoft.com/office/powerpoint/2010/main" val="4176096587"/>
+      </p:ext>
+    </p:extLst>
+  </p:cSld>
+  <p:clrMapOvr>
+    <a:masterClrMapping/>
+  </p:clrMapOvr>
+</p:sld>
+</file>
+
+<file path=ppt/slides/slide5.xml><?xml version="1.0" encoding="utf-8"?>
+<p:sld xmlns:a="http://schemas.openxmlformats.org/drawingml/2006/main" xmlns:r="http://schemas.openxmlformats.org/officeDocument/2006/relationships" xmlns:p="http://schemas.openxmlformats.org/presentationml/2006/main">
+  <p:cSld>
+    <p:spTree>
+      <p:nvGrpSpPr>
+        <p:cNvPr id="1" name=""/>
+        <p:cNvGrpSpPr/>
+        <p:nvPr/>
+      </p:nvGrpSpPr>
+      <p:grpSpPr>
+        <a:xfrm>
+          <a:off x="0" y="0"/>
+          <a:ext cx="0" cy="0"/>
+          <a:chOff x="0" y="0"/>
+          <a:chExt cx="0" cy="0"/>
+        </a:xfrm>
+      </p:grpSpPr>
+      <p:sp>
+        <p:nvSpPr>
+          <p:cNvPr id="2" name="Date Placeholder 1"/>
+          <p:cNvSpPr>
+            <a:spLocks noGrp="1"/>
+          </p:cNvSpPr>
+          <p:nvPr>
+            <p:ph type="dt" sz="half" idx="10"/>
+          </p:nvPr>
+        </p:nvSpPr>
+        <p:spPr/>
+        <p:txBody>
+          <a:bodyPr/>
+          <a:lstStyle/>
+          <a:p>
+            <a:fld id="{7E37C362-8B6B-44E6-96A6-D3578FE67DFA}" type="datetime3">
+              <a:rPr lang="en-US" smtClean="0"/>
+              <a:t>29 May 2019</a:t>
+            </a:fld>
+            <a:endParaRPr lang="en-US"/>
+          </a:p>
+        </p:txBody>
+      </p:sp>
+      <p:sp>
+        <p:nvSpPr>
+          <p:cNvPr id="3" name="Footer Placeholder 2"/>
+          <p:cNvSpPr>
+            <a:spLocks noGrp="1"/>
+          </p:cNvSpPr>
+          <p:nvPr>
+            <p:ph type="ftr" sz="quarter" idx="11"/>
+          </p:nvPr>
+        </p:nvSpPr>
+        <p:spPr/>
+        <p:txBody>
+          <a:bodyPr/>
+          <a:lstStyle/>
+          <a:p>
+            <a:r>
+              <a:rPr lang="fi-FI"/>
+              <a:t>NTUA, G. Bakas</a:t>
+            </a:r>
+            <a:endParaRPr lang="en-US"/>
+          </a:p>
+        </p:txBody>
+      </p:sp>
+      <mc:AlternateContent xmlns:mc="http://schemas.openxmlformats.org/markup-compatibility/2006" xmlns:a14="http://schemas.microsoft.com/office/drawing/2010/main">
+        <mc:Choice Requires="a14">
           <p:sp>
             <p:nvSpPr>
               <p:cNvPr id="4" name="TextBox 3"/>
@@ -7572,11 +10015,7 @@
                 </a:r>
                 <a:r>
                   <a:rPr lang="en-US" sz="1600" dirty="0"/>
-                  <a:t>, boost it to the ZMF and find the rapidity difference of the two leading </a:t>
-                </a:r>
-                <a:r>
-                  <a:rPr lang="en-US" sz="1600" dirty="0" smtClean="0"/>
-                  <a:t>jets</a:t>
+                  <a:t>, boost it to the ZMF and find the rapidity difference of the two leading jets</a:t>
                 </a:r>
               </a:p>
               <a:p>
@@ -7586,50 +10025,45 @@
               <a:p>
                 <a:pPr lvl="1"/>
                 <a:r>
-                  <a:rPr lang="en-US" sz="1600" dirty="0" smtClean="0"/>
+                  <a:rPr lang="en-US" sz="1600" dirty="0"/>
                   <a:t>We also define </a:t>
                 </a:r>
                 <a:r>
-                  <a:rPr lang="en-US" sz="1600" dirty="0" err="1" smtClean="0"/>
+                  <a:rPr lang="en-US" sz="1600" dirty="0" err="1"/>
                   <a:t>y</a:t>
                 </a:r>
                 <a:r>
-                  <a:rPr lang="en-US" sz="1600" baseline="-25000" dirty="0" err="1" smtClean="0"/>
-                  <a:t>Boos</a:t>
+                  <a:rPr lang="en-US" sz="1600" baseline="-25000" dirty="0" err="1"/>
+                  <a:t>Boost</a:t>
                 </a:r>
                 <a:r>
-                  <a:rPr lang="en-US" sz="1600" baseline="-25000" dirty="0" err="1" smtClean="0"/>
-                  <a:t>t</a:t>
-                </a:r>
-                <a:r>
-                  <a:rPr lang="en-US" sz="1600" dirty="0" smtClean="0"/>
+                  <a:rPr lang="en-US" sz="1600" dirty="0"/>
                   <a:t> = 0.5(y</a:t>
                 </a:r>
                 <a:r>
-                  <a:rPr lang="en-US" sz="1600" baseline="-25000" dirty="0" smtClean="0"/>
+                  <a:rPr lang="en-US" sz="1600" baseline="-25000" dirty="0"/>
                   <a:t>1</a:t>
                 </a:r>
                 <a:r>
-                  <a:rPr lang="en-US" sz="1600" dirty="0" smtClean="0"/>
+                  <a:rPr lang="en-US" sz="1600" dirty="0"/>
                   <a:t> + y</a:t>
                 </a:r>
                 <a:r>
-                  <a:rPr lang="en-US" sz="1600" baseline="-25000" dirty="0" smtClean="0"/>
+                  <a:rPr lang="en-US" sz="1600" baseline="-25000" dirty="0"/>
                   <a:t>2</a:t>
                 </a:r>
                 <a:r>
-                  <a:rPr lang="en-US" sz="1600" dirty="0" smtClean="0"/>
+                  <a:rPr lang="en-US" sz="1600" dirty="0"/>
                   <a:t>) which specifies the longitudinal boost by which the </a:t>
                 </a:r>
                 <a:r>
-                  <a:rPr lang="en-US" sz="1600" dirty="0" err="1" smtClean="0"/>
+                  <a:rPr lang="en-US" sz="1600" dirty="0" err="1"/>
                   <a:t>dijet</a:t>
                 </a:r>
                 <a:r>
-                  <a:rPr lang="en-US" sz="1600" dirty="0" smtClean="0"/>
+                  <a:rPr lang="en-US" sz="1600" dirty="0"/>
                   <a:t> CM frame is boosted with respect to the detector frame</a:t>
                 </a:r>
-                <a:endParaRPr lang="en-US" sz="1600" dirty="0"/>
               </a:p>
               <a:p>
                 <a:pPr lvl="1"/>
@@ -7999,7 +10433,7 @@
               <a:p>
                 <a:pPr lvl="1"/>
                 <a:r>
-                  <a:rPr lang="en-US" sz="1600" dirty="0" smtClean="0"/>
+                  <a:rPr lang="en-US" sz="1600" dirty="0"/>
                   <a:t>	</a:t>
                 </a:r>
               </a:p>
@@ -8032,7 +10466,7 @@
             </p:txBody>
           </p:sp>
         </mc:Choice>
-        <mc:Fallback>
+        <mc:Fallback xmlns="">
           <p:sp>
             <p:nvSpPr>
               <p:cNvPr id="4" name="TextBox 3"/>
@@ -8118,7 +10552,7 @@
           <a:p>
             <a:fld id="{AEEFAC8D-0A19-DC49-9F7A-4BFCAD95B105}" type="slidenum">
               <a:rPr lang="en-US" smtClean="0"/>
-              <a:t>2</a:t>
+              <a:t>5</a:t>
             </a:fld>
             <a:endParaRPr lang="en-US"/>
           </a:p>
@@ -8127,7 +10561,7 @@
     </p:spTree>
     <p:extLst>
       <p:ext uri="{BB962C8B-B14F-4D97-AF65-F5344CB8AC3E}">
-        <p14:creationId xmlns:p14="http://schemas.microsoft.com/office/powerpoint/2010/main" val="292727523"/>
+        <p14:creationId xmlns:p14="http://schemas.microsoft.com/office/powerpoint/2010/main" val="2564436146"/>
       </p:ext>
     </p:extLst>
   </p:cSld>
@@ -8137,7 +10571,7 @@
 </p:sld>
 </file>
 
-<file path=ppt/slides/slide3.xml><?xml version="1.0" encoding="utf-8"?>
+<file path=ppt/slides/slide6.xml><?xml version="1.0" encoding="utf-8"?>
 <p:sld xmlns:a="http://schemas.openxmlformats.org/drawingml/2006/main" xmlns:r="http://schemas.openxmlformats.org/officeDocument/2006/relationships" xmlns:p="http://schemas.openxmlformats.org/presentationml/2006/main">
   <p:cSld>
     <p:spTree>
@@ -8171,7 +10605,7 @@
           <a:p>
             <a:fld id="{482AA653-8872-4AEA-B19D-0BF0F1064A5A}" type="datetime3">
               <a:rPr lang="en-US" smtClean="0"/>
-              <a:t>28 May 2019</a:t>
+              <a:t>29 May 2019</a:t>
             </a:fld>
             <a:endParaRPr lang="en-US"/>
           </a:p>
@@ -8227,7 +10661,7 @@
               <a:buChar char="•"/>
             </a:pPr>
             <a:r>
-              <a:rPr lang="en-US" sz="1600" dirty="0" smtClean="0"/>
+              <a:rPr lang="en-US" sz="1600" dirty="0"/>
               <a:t>Selection:</a:t>
             </a:r>
           </a:p>
@@ -8237,19 +10671,15 @@
               <a:buChar char="•"/>
             </a:pPr>
             <a:r>
-              <a:rPr lang="en-US" sz="1600" dirty="0" smtClean="0"/>
+              <a:rPr lang="en-US" sz="1600" dirty="0"/>
               <a:t>Parton: </a:t>
             </a:r>
             <a:r>
-              <a:rPr lang="it-IT" sz="1600" dirty="0" smtClean="0"/>
-              <a:t>partonPt </a:t>
-            </a:r>
-            <a:r>
               <a:rPr lang="it-IT" sz="1600" dirty="0"/>
-              <a:t>&gt; </a:t>
-            </a:r>
-            <a:r>
-              <a:rPr lang="el-GR" sz="1600" dirty="0" smtClean="0">
+              <a:t>partonPt &gt; </a:t>
+            </a:r>
+            <a:r>
+              <a:rPr lang="el-GR" sz="1600" dirty="0">
                 <a:solidFill>
                   <a:srgbClr val="FF0000"/>
                 </a:solidFill>
@@ -8257,20 +10687,8 @@
               <a:t>500*</a:t>
             </a:r>
             <a:r>
-              <a:rPr lang="it-IT" sz="1600" dirty="0" smtClean="0"/>
-              <a:t>, </a:t>
-            </a:r>
-            <a:r>
-              <a:rPr lang="it-IT" sz="1600" dirty="0" smtClean="0"/>
-              <a:t>|partonEta|&lt; 2.4,  mTTbarParton </a:t>
-            </a:r>
-            <a:r>
               <a:rPr lang="it-IT" sz="1600" dirty="0"/>
-              <a:t>&gt; </a:t>
-            </a:r>
-            <a:r>
-              <a:rPr lang="it-IT" sz="1600" dirty="0" smtClean="0"/>
-              <a:t>1000</a:t>
+              <a:t>, |partonEta|&lt; 2.4,  mTTbarParton &gt; 1000</a:t>
             </a:r>
           </a:p>
           <a:p>
@@ -8279,15 +10697,11 @@
               <a:buChar char="•"/>
             </a:pPr>
             <a:r>
-              <a:rPr lang="it-IT" sz="1600" dirty="0" smtClean="0"/>
-              <a:t>Reco: </a:t>
-            </a:r>
-            <a:r>
-              <a:rPr lang="it-IT" sz="1600" dirty="0" smtClean="0"/>
-              <a:t>jetPt&gt;</a:t>
-            </a:r>
-            <a:r>
-              <a:rPr lang="el-GR" sz="1600" dirty="0" smtClean="0">
+              <a:rPr lang="it-IT" sz="1600" dirty="0"/>
+              <a:t>Reco: jetPt&gt;</a:t>
+            </a:r>
+            <a:r>
+              <a:rPr lang="el-GR" sz="1600" dirty="0">
                 <a:solidFill>
                   <a:srgbClr val="FF0000"/>
                 </a:solidFill>
@@ -8295,12 +10709,8 @@
               <a:t>500</a:t>
             </a:r>
             <a:r>
-              <a:rPr lang="it-IT" sz="1600" dirty="0" smtClean="0"/>
-              <a:t>, </a:t>
-            </a:r>
-            <a:r>
-              <a:rPr lang="it-IT" sz="1600" dirty="0" smtClean="0"/>
-              <a:t>|jetEta| &lt; 2.4, nLeptons ==0</a:t>
+              <a:rPr lang="it-IT" sz="1600" dirty="0"/>
+              <a:t>, |jetEta| &lt; 2.4, nLeptons ==0</a:t>
             </a:r>
           </a:p>
           <a:p>
@@ -8309,7 +10719,7 @@
               <a:buChar char="•"/>
             </a:pPr>
             <a:r>
-              <a:rPr lang="it-IT" sz="1600" dirty="0" smtClean="0"/>
+              <a:rPr lang="it-IT" sz="1600" dirty="0"/>
               <a:t>Btagging Medium working point</a:t>
             </a:r>
           </a:p>
@@ -8319,7 +10729,7 @@
               <a:buChar char="•"/>
             </a:pPr>
             <a:r>
-              <a:rPr lang="it-IT" sz="1600" dirty="0" smtClean="0"/>
+              <a:rPr lang="it-IT" sz="1600" dirty="0"/>
               <a:t>Top tagger mva &gt; 0.3</a:t>
             </a:r>
           </a:p>
@@ -8329,7 +10739,7 @@
               <a:buChar char="•"/>
             </a:pPr>
             <a:r>
-              <a:rPr lang="it-IT" sz="1600" dirty="0" smtClean="0"/>
+              <a:rPr lang="it-IT" sz="1600" dirty="0"/>
               <a:t>Jet mass soft Drop (120, 220)GeV</a:t>
             </a:r>
           </a:p>
@@ -8339,7 +10749,7 @@
               <a:buChar char="•"/>
             </a:pPr>
             <a:r>
-              <a:rPr lang="it-IT" sz="1600" dirty="0" smtClean="0"/>
+              <a:rPr lang="it-IT" sz="1600" dirty="0"/>
               <a:t>Jets are matched</a:t>
             </a:r>
             <a:endParaRPr lang="en-US" sz="1600" dirty="0"/>
@@ -8349,7 +10759,7 @@
               <a:buFont typeface="Arial" panose="020B0604020202020204" pitchFamily="34" charset="0"/>
               <a:buChar char="•"/>
             </a:pPr>
-            <a:endParaRPr lang="en-US" sz="1600" dirty="0" smtClean="0"/>
+            <a:endParaRPr lang="en-US" sz="1600" dirty="0"/>
           </a:p>
           <a:p>
             <a:pPr marL="285750" indent="-285750">
@@ -8357,40 +10767,32 @@
               <a:buChar char="•"/>
             </a:pPr>
             <a:r>
-              <a:rPr lang="en-US" sz="1600" dirty="0" smtClean="0"/>
+              <a:rPr lang="en-US" sz="1600" dirty="0"/>
               <a:t>Response matrix of </a:t>
             </a:r>
             <a:r>
-              <a:rPr lang="el-GR" sz="1600" dirty="0" smtClean="0"/>
+              <a:rPr lang="el-GR" sz="1600" dirty="0"/>
               <a:t>χ</a:t>
             </a:r>
             <a:r>
-              <a:rPr lang="en-US" sz="1600" baseline="-25000" dirty="0" err="1" smtClean="0"/>
+              <a:rPr lang="en-US" sz="1600" baseline="-25000" dirty="0" err="1"/>
               <a:t>reco</a:t>
             </a:r>
             <a:r>
-              <a:rPr lang="en-US" sz="1600" dirty="0" smtClean="0"/>
+              <a:rPr lang="en-US" sz="1600" dirty="0"/>
               <a:t>, </a:t>
             </a:r>
             <a:r>
-              <a:rPr lang="el-GR" sz="1600" dirty="0" smtClean="0"/>
+              <a:rPr lang="el-GR" sz="1600" dirty="0"/>
               <a:t>χ</a:t>
             </a:r>
             <a:r>
-              <a:rPr lang="en-US" sz="1600" baseline="-25000" dirty="0" err="1" smtClean="0"/>
+              <a:rPr lang="en-US" sz="1600" baseline="-25000" dirty="0" err="1"/>
               <a:t>parton</a:t>
             </a:r>
             <a:r>
-              <a:rPr lang="en-US" sz="1600" dirty="0" smtClean="0"/>
-              <a:t> with </a:t>
-            </a:r>
-            <a:r>
               <a:rPr lang="en-US" sz="1600" dirty="0"/>
-              <a:t>{1,2,3,4,5,6,8,10,13,16} </a:t>
-            </a:r>
-            <a:r>
-              <a:rPr lang="en-US" sz="1600" dirty="0" smtClean="0"/>
-              <a:t>as variable binning</a:t>
+              <a:t> with {1,2,3,4,5,6,8,10,13,16} as variable binning</a:t>
             </a:r>
           </a:p>
           <a:p>
@@ -8406,15 +10808,15 @@
               <a:buChar char="•"/>
             </a:pPr>
             <a:r>
-              <a:rPr lang="en-US" sz="1600" dirty="0" smtClean="0"/>
+              <a:rPr lang="en-US" sz="1600" dirty="0"/>
               <a:t>The same binning is then used to find the response matrices in different mass (</a:t>
             </a:r>
             <a:r>
-              <a:rPr lang="en-US" sz="1600" dirty="0" err="1" smtClean="0"/>
+              <a:rPr lang="en-US" sz="1600" dirty="0" err="1"/>
               <a:t>mTTbar</a:t>
             </a:r>
             <a:r>
-              <a:rPr lang="en-US" sz="1600" dirty="0" smtClean="0"/>
+              <a:rPr lang="en-US" sz="1600" dirty="0"/>
               <a:t>) regions</a:t>
             </a:r>
           </a:p>
@@ -8424,7 +10826,7 @@
               <a:buChar char="•"/>
             </a:pPr>
             <a:r>
-              <a:rPr lang="en-US" sz="1600" dirty="0" smtClean="0"/>
+              <a:rPr lang="en-US" sz="1600" dirty="0"/>
               <a:t>[1000-1600]GeV</a:t>
             </a:r>
           </a:p>
@@ -8434,10 +10836,9 @@
               <a:buChar char="•"/>
             </a:pPr>
             <a:r>
-              <a:rPr lang="en-US" sz="1600" dirty="0" smtClean="0"/>
+              <a:rPr lang="en-US" sz="1600" dirty="0"/>
               <a:t>[1600-2200]GeV</a:t>
             </a:r>
-            <a:endParaRPr lang="en-US" sz="1600" dirty="0"/>
           </a:p>
           <a:p>
             <a:pPr marL="742950" lvl="1" indent="-285750">
@@ -8445,7 +10846,7 @@
               <a:buChar char="•"/>
             </a:pPr>
             <a:r>
-              <a:rPr lang="en-US" sz="1600" dirty="0" smtClean="0"/>
+              <a:rPr lang="en-US" sz="1600" dirty="0"/>
               <a:t>[2200-3000]GeV</a:t>
             </a:r>
           </a:p>
@@ -8455,7 +10856,7 @@
               <a:buChar char="•"/>
             </a:pPr>
             <a:r>
-              <a:rPr lang="en-US" sz="1600" dirty="0" smtClean="0"/>
+              <a:rPr lang="en-US" sz="1600" dirty="0"/>
               <a:t>[3000-3600]GeV</a:t>
             </a:r>
           </a:p>
@@ -8465,7 +10866,7 @@
               <a:buChar char="•"/>
             </a:pPr>
             <a:r>
-              <a:rPr lang="en-US" sz="1600" dirty="0" smtClean="0"/>
+              <a:rPr lang="en-US" sz="1600" dirty="0"/>
               <a:t>[3600-6000]GeV</a:t>
             </a:r>
           </a:p>
@@ -8482,15 +10883,15 @@
               <a:buChar char="•"/>
             </a:pPr>
             <a:r>
-              <a:rPr lang="en-US" sz="1600" dirty="0" smtClean="0"/>
+              <a:rPr lang="en-US" sz="1600" dirty="0"/>
               <a:t>Stability, Efficiency for </a:t>
             </a:r>
             <a:r>
-              <a:rPr lang="el-GR" sz="1600" dirty="0" smtClean="0"/>
+              <a:rPr lang="el-GR" sz="1600" dirty="0"/>
               <a:t>χ</a:t>
             </a:r>
             <a:r>
-              <a:rPr lang="en-US" sz="1600" dirty="0" smtClean="0"/>
+              <a:rPr lang="en-US" sz="1600" dirty="0"/>
               <a:t> distribution</a:t>
             </a:r>
           </a:p>
@@ -8507,11 +10908,11 @@
               <a:buChar char="•"/>
             </a:pPr>
             <a:r>
-              <a:rPr lang="en-US" sz="1600" dirty="0" smtClean="0"/>
+              <a:rPr lang="en-US" sz="1600" dirty="0"/>
               <a:t>Acceptance and purity for </a:t>
             </a:r>
             <a:r>
-              <a:rPr lang="el-GR" sz="1600" dirty="0" smtClean="0"/>
+              <a:rPr lang="el-GR" sz="1600" dirty="0"/>
               <a:t>χ</a:t>
             </a:r>
           </a:p>
@@ -8524,10 +10925,9 @@
           </a:p>
           <a:p>
             <a:r>
-              <a:rPr lang="en-US" sz="1600" dirty="0" smtClean="0"/>
+              <a:rPr lang="en-US" sz="1600" dirty="0"/>
               <a:t>*By applying the Pt to be more than 500, we get more similar results with ATLAS</a:t>
             </a:r>
-            <a:endParaRPr lang="en-US" sz="1600" dirty="0"/>
           </a:p>
           <a:p>
             <a:pPr lvl="1"/>
@@ -8572,7 +10972,7 @@
           <a:lstStyle/>
           <a:p>
             <a:r>
-              <a:rPr lang="en-US" u="sng" dirty="0" smtClean="0"/>
+              <a:rPr lang="en-US" u="sng" dirty="0"/>
               <a:t>Response Matrices</a:t>
             </a:r>
             <a:endParaRPr lang="en-GB" u="sng" dirty="0"/>
@@ -8596,7 +10996,7 @@
           <a:p>
             <a:fld id="{AEEFAC8D-0A19-DC49-9F7A-4BFCAD95B105}" type="slidenum">
               <a:rPr lang="en-US" smtClean="0"/>
-              <a:t>3</a:t>
+              <a:t>6</a:t>
             </a:fld>
             <a:endParaRPr lang="en-US"/>
           </a:p>
@@ -8615,7 +11015,7 @@
 </p:sld>
 </file>
 
-<file path=ppt/slides/slide4.xml><?xml version="1.0" encoding="utf-8"?>
+<file path=ppt/slides/slide7.xml><?xml version="1.0" encoding="utf-8"?>
 <p:sld xmlns:a="http://schemas.openxmlformats.org/drawingml/2006/main" xmlns:r="http://schemas.openxmlformats.org/officeDocument/2006/relationships" xmlns:p="http://schemas.openxmlformats.org/presentationml/2006/main">
   <p:cSld>
     <p:spTree>
@@ -8649,7 +11049,7 @@
           <a:p>
             <a:fld id="{482AA653-8872-4AEA-B19D-0BF0F1064A5A}" type="datetime3">
               <a:rPr lang="en-US" smtClean="0"/>
-              <a:t>28 May 2019</a:t>
+              <a:t>29 May 2019</a:t>
             </a:fld>
             <a:endParaRPr lang="en-US"/>
           </a:p>
@@ -8701,15 +11101,11 @@
           <a:lstStyle/>
           <a:p>
             <a:r>
-              <a:rPr lang="en-US" u="sng" dirty="0" smtClean="0"/>
-              <a:t>Response </a:t>
-            </a:r>
-            <a:r>
-              <a:rPr lang="en-US" u="sng" dirty="0" smtClean="0"/>
-              <a:t>Matrix for </a:t>
-            </a:r>
-            <a:r>
-              <a:rPr lang="el-GR" u="sng" dirty="0" smtClean="0"/>
+              <a:rPr lang="en-US" u="sng" dirty="0"/>
+              <a:t>Response Matrix for </a:t>
+            </a:r>
+            <a:r>
+              <a:rPr lang="el-GR" u="sng" dirty="0"/>
               <a:t>χ </a:t>
             </a:r>
             <a:endParaRPr lang="en-GB" u="sng" dirty="0"/>
@@ -8733,7 +11129,7 @@
           <a:p>
             <a:fld id="{AEEFAC8D-0A19-DC49-9F7A-4BFCAD95B105}" type="slidenum">
               <a:rPr lang="en-US" smtClean="0"/>
-              <a:t>4</a:t>
+              <a:t>7</a:t>
             </a:fld>
             <a:endParaRPr lang="en-US"/>
           </a:p>
@@ -8782,7 +11178,7 @@
 </p:sld>
 </file>
 
-<file path=ppt/slides/slide5.xml><?xml version="1.0" encoding="utf-8"?>
+<file path=ppt/slides/slide8.xml><?xml version="1.0" encoding="utf-8"?>
 <p:sld xmlns:a="http://schemas.openxmlformats.org/drawingml/2006/main" xmlns:r="http://schemas.openxmlformats.org/officeDocument/2006/relationships" xmlns:p="http://schemas.openxmlformats.org/presentationml/2006/main">
   <p:cSld>
     <p:spTree>
@@ -8816,7 +11212,7 @@
           <a:p>
             <a:fld id="{482AA653-8872-4AEA-B19D-0BF0F1064A5A}" type="datetime3">
               <a:rPr lang="en-US" smtClean="0"/>
-              <a:t>28 May 2019</a:t>
+              <a:t>29 May 2019</a:t>
             </a:fld>
             <a:endParaRPr lang="en-US"/>
           </a:p>
@@ -8868,10 +11264,9 @@
           <a:lstStyle/>
           <a:p>
             <a:r>
-              <a:rPr lang="en-GB" u="sng" dirty="0" smtClean="0"/>
+              <a:rPr lang="en-GB" u="sng" dirty="0"/>
               <a:t>Efficiency and Acceptance for chi distribution</a:t>
             </a:r>
-            <a:endParaRPr lang="en-GB" u="sng" dirty="0"/>
           </a:p>
         </p:txBody>
       </p:sp>
@@ -8892,7 +11287,7 @@
           <a:p>
             <a:fld id="{AEEFAC8D-0A19-DC49-9F7A-4BFCAD95B105}" type="slidenum">
               <a:rPr lang="en-US" smtClean="0"/>
-              <a:t>5</a:t>
+              <a:t>8</a:t>
             </a:fld>
             <a:endParaRPr lang="en-US"/>
           </a:p>
@@ -8941,7 +11336,7 @@
 </p:sld>
 </file>
 
-<file path=ppt/slides/slide6.xml><?xml version="1.0" encoding="utf-8"?>
+<file path=ppt/slides/slide9.xml><?xml version="1.0" encoding="utf-8"?>
 <p:sld xmlns:a="http://schemas.openxmlformats.org/drawingml/2006/main" xmlns:r="http://schemas.openxmlformats.org/officeDocument/2006/relationships" xmlns:p="http://schemas.openxmlformats.org/presentationml/2006/main">
   <p:cSld>
     <p:spTree>
@@ -8975,7 +11370,7 @@
           <a:p>
             <a:fld id="{482AA653-8872-4AEA-B19D-0BF0F1064A5A}" type="datetime3">
               <a:rPr lang="en-US" smtClean="0"/>
-              <a:t>28 May 2019</a:t>
+              <a:t>29 May 2019</a:t>
             </a:fld>
             <a:endParaRPr lang="en-US"/>
           </a:p>
@@ -9027,10 +11422,9 @@
           <a:lstStyle/>
           <a:p>
             <a:r>
-              <a:rPr lang="en-GB" u="sng" dirty="0" smtClean="0"/>
+              <a:rPr lang="en-GB" u="sng" dirty="0"/>
               <a:t>Purity and Stability for chi distribution</a:t>
             </a:r>
-            <a:endParaRPr lang="en-GB" u="sng" dirty="0"/>
           </a:p>
         </p:txBody>
       </p:sp>
@@ -9051,7 +11445,7 @@
           <a:p>
             <a:fld id="{AEEFAC8D-0A19-DC49-9F7A-4BFCAD95B105}" type="slidenum">
               <a:rPr lang="en-US" smtClean="0"/>
-              <a:t>6</a:t>
+              <a:t>9</a:t>
             </a:fld>
             <a:endParaRPr lang="en-US"/>
           </a:p>
@@ -9091,693 +11485,6 @@
     <p:extLst>
       <p:ext uri="{BB962C8B-B14F-4D97-AF65-F5344CB8AC3E}">
         <p14:creationId xmlns:p14="http://schemas.microsoft.com/office/powerpoint/2010/main" val="3236311864"/>
-      </p:ext>
-    </p:extLst>
-  </p:cSld>
-  <p:clrMapOvr>
-    <a:masterClrMapping/>
-  </p:clrMapOvr>
-</p:sld>
-</file>
-
-<file path=ppt/slides/slide7.xml><?xml version="1.0" encoding="utf-8"?>
-<p:sld xmlns:a="http://schemas.openxmlformats.org/drawingml/2006/main" xmlns:r="http://schemas.openxmlformats.org/officeDocument/2006/relationships" xmlns:p="http://schemas.openxmlformats.org/presentationml/2006/main">
-  <p:cSld>
-    <p:spTree>
-      <p:nvGrpSpPr>
-        <p:cNvPr id="1" name=""/>
-        <p:cNvGrpSpPr/>
-        <p:nvPr/>
-      </p:nvGrpSpPr>
-      <p:grpSpPr>
-        <a:xfrm>
-          <a:off x="0" y="0"/>
-          <a:ext cx="0" cy="0"/>
-          <a:chOff x="0" y="0"/>
-          <a:chExt cx="0" cy="0"/>
-        </a:xfrm>
-      </p:grpSpPr>
-      <p:sp>
-        <p:nvSpPr>
-          <p:cNvPr id="2" name="Date Placeholder 1"/>
-          <p:cNvSpPr>
-            <a:spLocks noGrp="1"/>
-          </p:cNvSpPr>
-          <p:nvPr>
-            <p:ph type="dt" sz="half" idx="10"/>
-          </p:nvPr>
-        </p:nvSpPr>
-        <p:spPr/>
-        <p:txBody>
-          <a:bodyPr/>
-          <a:lstStyle/>
-          <a:p>
-            <a:fld id="{482AA653-8872-4AEA-B19D-0BF0F1064A5A}" type="datetime3">
-              <a:rPr lang="en-US" smtClean="0"/>
-              <a:t>28 May 2019</a:t>
-            </a:fld>
-            <a:endParaRPr lang="en-US"/>
-          </a:p>
-        </p:txBody>
-      </p:sp>
-      <p:sp>
-        <p:nvSpPr>
-          <p:cNvPr id="3" name="Footer Placeholder 2"/>
-          <p:cNvSpPr>
-            <a:spLocks noGrp="1"/>
-          </p:cNvSpPr>
-          <p:nvPr>
-            <p:ph type="ftr" sz="quarter" idx="11"/>
-          </p:nvPr>
-        </p:nvSpPr>
-        <p:spPr/>
-        <p:txBody>
-          <a:bodyPr/>
-          <a:lstStyle/>
-          <a:p>
-            <a:r>
-              <a:rPr lang="fi-FI"/>
-              <a:t>NTUA, G. Bakas</a:t>
-            </a:r>
-            <a:endParaRPr lang="en-US"/>
-          </a:p>
-        </p:txBody>
-      </p:sp>
-      <p:sp>
-        <p:nvSpPr>
-          <p:cNvPr id="6" name="Slide Number Placeholder 5"/>
-          <p:cNvSpPr>
-            <a:spLocks noGrp="1"/>
-          </p:cNvSpPr>
-          <p:nvPr>
-            <p:ph type="sldNum" sz="quarter" idx="12"/>
-          </p:nvPr>
-        </p:nvSpPr>
-        <p:spPr/>
-        <p:txBody>
-          <a:bodyPr/>
-          <a:lstStyle/>
-          <a:p>
-            <a:fld id="{AEEFAC8D-0A19-DC49-9F7A-4BFCAD95B105}" type="slidenum">
-              <a:rPr lang="en-US" smtClean="0"/>
-              <a:t>7</a:t>
-            </a:fld>
-            <a:endParaRPr lang="en-US"/>
-          </a:p>
-        </p:txBody>
-      </p:sp>
-      <p:pic>
-        <p:nvPicPr>
-          <p:cNvPr id="12" name="Picture 11"/>
-          <p:cNvPicPr>
-            <a:picLocks noChangeAspect="1"/>
-          </p:cNvPicPr>
-          <p:nvPr/>
-        </p:nvPicPr>
-        <p:blipFill>
-          <a:blip r:embed="rId3">
-            <a:extLst>
-              <a:ext uri="{28A0092B-C50C-407E-A947-70E740481C1C}">
-                <a14:useLocalDpi xmlns:a14="http://schemas.microsoft.com/office/drawing/2010/main" val="0"/>
-              </a:ext>
-            </a:extLst>
-          </a:blip>
-          <a:stretch>
-            <a:fillRect/>
-          </a:stretch>
-        </p:blipFill>
-        <p:spPr>
-          <a:xfrm>
-            <a:off x="0" y="811762"/>
-            <a:ext cx="5559743" cy="4462278"/>
-          </a:xfrm>
-          <a:prstGeom prst="rect">
-            <a:avLst/>
-          </a:prstGeom>
-        </p:spPr>
-      </p:pic>
-      <p:pic>
-        <p:nvPicPr>
-          <p:cNvPr id="13" name="Picture 12"/>
-          <p:cNvPicPr>
-            <a:picLocks noChangeAspect="1"/>
-          </p:cNvPicPr>
-          <p:nvPr/>
-        </p:nvPicPr>
-        <p:blipFill>
-          <a:blip r:embed="rId4">
-            <a:extLst>
-              <a:ext uri="{28A0092B-C50C-407E-A947-70E740481C1C}">
-                <a14:useLocalDpi xmlns:a14="http://schemas.microsoft.com/office/drawing/2010/main" val="0"/>
-              </a:ext>
-            </a:extLst>
-          </a:blip>
-          <a:stretch>
-            <a:fillRect/>
-          </a:stretch>
-        </p:blipFill>
-        <p:spPr>
-          <a:xfrm>
-            <a:off x="6316632" y="746448"/>
-            <a:ext cx="5559743" cy="4527592"/>
-          </a:xfrm>
-          <a:prstGeom prst="rect">
-            <a:avLst/>
-          </a:prstGeom>
-        </p:spPr>
-      </p:pic>
-      <p:pic>
-        <p:nvPicPr>
-          <p:cNvPr id="14" name="Picture 13"/>
-          <p:cNvPicPr>
-            <a:picLocks noChangeAspect="1"/>
-          </p:cNvPicPr>
-          <p:nvPr/>
-        </p:nvPicPr>
-        <p:blipFill>
-          <a:blip r:embed="rId5"/>
-          <a:stretch>
-            <a:fillRect/>
-          </a:stretch>
-        </p:blipFill>
-        <p:spPr>
-          <a:xfrm>
-            <a:off x="4541174" y="5061413"/>
-            <a:ext cx="549285" cy="189573"/>
-          </a:xfrm>
-          <a:prstGeom prst="rect">
-            <a:avLst/>
-          </a:prstGeom>
-        </p:spPr>
-      </p:pic>
-      <p:pic>
-        <p:nvPicPr>
-          <p:cNvPr id="15" name="Picture 14"/>
-          <p:cNvPicPr>
-            <a:picLocks noChangeAspect="1"/>
-          </p:cNvPicPr>
-          <p:nvPr/>
-        </p:nvPicPr>
-        <p:blipFill>
-          <a:blip r:embed="rId5"/>
-          <a:stretch>
-            <a:fillRect/>
-          </a:stretch>
-        </p:blipFill>
-        <p:spPr>
-          <a:xfrm>
-            <a:off x="10805125" y="5060131"/>
-            <a:ext cx="549285" cy="189573"/>
-          </a:xfrm>
-          <a:prstGeom prst="rect">
-            <a:avLst/>
-          </a:prstGeom>
-        </p:spPr>
-      </p:pic>
-      <p:pic>
-        <p:nvPicPr>
-          <p:cNvPr id="16" name="Picture 15"/>
-          <p:cNvPicPr>
-            <a:picLocks noChangeAspect="1"/>
-          </p:cNvPicPr>
-          <p:nvPr/>
-        </p:nvPicPr>
-        <p:blipFill>
-          <a:blip r:embed="rId6"/>
-          <a:stretch>
-            <a:fillRect/>
-          </a:stretch>
-        </p:blipFill>
-        <p:spPr>
-          <a:xfrm>
-            <a:off x="173103" y="1244374"/>
-            <a:ext cx="209122" cy="472460"/>
-          </a:xfrm>
-          <a:prstGeom prst="rect">
-            <a:avLst/>
-          </a:prstGeom>
-        </p:spPr>
-      </p:pic>
-      <p:pic>
-        <p:nvPicPr>
-          <p:cNvPr id="17" name="Picture 16"/>
-          <p:cNvPicPr>
-            <a:picLocks noChangeAspect="1"/>
-          </p:cNvPicPr>
-          <p:nvPr/>
-        </p:nvPicPr>
-        <p:blipFill>
-          <a:blip r:embed="rId6"/>
-          <a:stretch>
-            <a:fillRect/>
-          </a:stretch>
-        </p:blipFill>
-        <p:spPr>
-          <a:xfrm>
-            <a:off x="6474377" y="1250887"/>
-            <a:ext cx="209122" cy="472460"/>
-          </a:xfrm>
-          <a:prstGeom prst="rect">
-            <a:avLst/>
-          </a:prstGeom>
-        </p:spPr>
-      </p:pic>
-    </p:spTree>
-    <p:extLst>
-      <p:ext uri="{BB962C8B-B14F-4D97-AF65-F5344CB8AC3E}">
-        <p14:creationId xmlns:p14="http://schemas.microsoft.com/office/powerpoint/2010/main" val="779823611"/>
-      </p:ext>
-    </p:extLst>
-  </p:cSld>
-  <p:clrMapOvr>
-    <a:masterClrMapping/>
-  </p:clrMapOvr>
-</p:sld>
-</file>
-
-<file path=ppt/slides/slide8.xml><?xml version="1.0" encoding="utf-8"?>
-<p:sld xmlns:a="http://schemas.openxmlformats.org/drawingml/2006/main" xmlns:r="http://schemas.openxmlformats.org/officeDocument/2006/relationships" xmlns:p="http://schemas.openxmlformats.org/presentationml/2006/main">
-  <p:cSld>
-    <p:spTree>
-      <p:nvGrpSpPr>
-        <p:cNvPr id="1" name=""/>
-        <p:cNvGrpSpPr/>
-        <p:nvPr/>
-      </p:nvGrpSpPr>
-      <p:grpSpPr>
-        <a:xfrm>
-          <a:off x="0" y="0"/>
-          <a:ext cx="0" cy="0"/>
-          <a:chOff x="0" y="0"/>
-          <a:chExt cx="0" cy="0"/>
-        </a:xfrm>
-      </p:grpSpPr>
-      <p:sp>
-        <p:nvSpPr>
-          <p:cNvPr id="2" name="Date Placeholder 1"/>
-          <p:cNvSpPr>
-            <a:spLocks noGrp="1"/>
-          </p:cNvSpPr>
-          <p:nvPr>
-            <p:ph type="dt" sz="half" idx="10"/>
-          </p:nvPr>
-        </p:nvSpPr>
-        <p:spPr/>
-        <p:txBody>
-          <a:bodyPr/>
-          <a:lstStyle/>
-          <a:p>
-            <a:fld id="{482AA653-8872-4AEA-B19D-0BF0F1064A5A}" type="datetime3">
-              <a:rPr lang="en-US" smtClean="0"/>
-              <a:t>28 May 2019</a:t>
-            </a:fld>
-            <a:endParaRPr lang="en-US"/>
-          </a:p>
-        </p:txBody>
-      </p:sp>
-      <p:sp>
-        <p:nvSpPr>
-          <p:cNvPr id="3" name="Footer Placeholder 2"/>
-          <p:cNvSpPr>
-            <a:spLocks noGrp="1"/>
-          </p:cNvSpPr>
-          <p:nvPr>
-            <p:ph type="ftr" sz="quarter" idx="11"/>
-          </p:nvPr>
-        </p:nvSpPr>
-        <p:spPr/>
-        <p:txBody>
-          <a:bodyPr/>
-          <a:lstStyle/>
-          <a:p>
-            <a:r>
-              <a:rPr lang="fi-FI"/>
-              <a:t>NTUA, G. Bakas</a:t>
-            </a:r>
-            <a:endParaRPr lang="en-US"/>
-          </a:p>
-        </p:txBody>
-      </p:sp>
-      <p:sp>
-        <p:nvSpPr>
-          <p:cNvPr id="6" name="Slide Number Placeholder 5"/>
-          <p:cNvSpPr>
-            <a:spLocks noGrp="1"/>
-          </p:cNvSpPr>
-          <p:nvPr>
-            <p:ph type="sldNum" sz="quarter" idx="12"/>
-          </p:nvPr>
-        </p:nvSpPr>
-        <p:spPr/>
-        <p:txBody>
-          <a:bodyPr/>
-          <a:lstStyle/>
-          <a:p>
-            <a:fld id="{AEEFAC8D-0A19-DC49-9F7A-4BFCAD95B105}" type="slidenum">
-              <a:rPr lang="en-US" smtClean="0"/>
-              <a:t>8</a:t>
-            </a:fld>
-            <a:endParaRPr lang="en-US"/>
-          </a:p>
-        </p:txBody>
-      </p:sp>
-      <p:pic>
-        <p:nvPicPr>
-          <p:cNvPr id="4" name="Picture 3"/>
-          <p:cNvPicPr>
-            <a:picLocks noChangeAspect="1"/>
-          </p:cNvPicPr>
-          <p:nvPr/>
-        </p:nvPicPr>
-        <p:blipFill>
-          <a:blip r:embed="rId3">
-            <a:extLst>
-              <a:ext uri="{28A0092B-C50C-407E-A947-70E740481C1C}">
-                <a14:useLocalDpi xmlns:a14="http://schemas.microsoft.com/office/drawing/2010/main" val="0"/>
-              </a:ext>
-            </a:extLst>
-          </a:blip>
-          <a:stretch>
-            <a:fillRect/>
-          </a:stretch>
-        </p:blipFill>
-        <p:spPr>
-          <a:xfrm>
-            <a:off x="0" y="868038"/>
-            <a:ext cx="5962261" cy="4529995"/>
-          </a:xfrm>
-          <a:prstGeom prst="rect">
-            <a:avLst/>
-          </a:prstGeom>
-        </p:spPr>
-      </p:pic>
-      <p:pic>
-        <p:nvPicPr>
-          <p:cNvPr id="5" name="Picture 4"/>
-          <p:cNvPicPr>
-            <a:picLocks noChangeAspect="1"/>
-          </p:cNvPicPr>
-          <p:nvPr/>
-        </p:nvPicPr>
-        <p:blipFill>
-          <a:blip r:embed="rId4">
-            <a:extLst>
-              <a:ext uri="{28A0092B-C50C-407E-A947-70E740481C1C}">
-                <a14:useLocalDpi xmlns:a14="http://schemas.microsoft.com/office/drawing/2010/main" val="0"/>
-              </a:ext>
-            </a:extLst>
-          </a:blip>
-          <a:stretch>
-            <a:fillRect/>
-          </a:stretch>
-        </p:blipFill>
-        <p:spPr>
-          <a:xfrm>
-            <a:off x="6223518" y="868037"/>
-            <a:ext cx="5968482" cy="4529995"/>
-          </a:xfrm>
-          <a:prstGeom prst="rect">
-            <a:avLst/>
-          </a:prstGeom>
-        </p:spPr>
-      </p:pic>
-      <p:pic>
-        <p:nvPicPr>
-          <p:cNvPr id="7" name="Picture 6"/>
-          <p:cNvPicPr>
-            <a:picLocks noChangeAspect="1"/>
-          </p:cNvPicPr>
-          <p:nvPr/>
-        </p:nvPicPr>
-        <p:blipFill>
-          <a:blip r:embed="rId5"/>
-          <a:stretch>
-            <a:fillRect/>
-          </a:stretch>
-        </p:blipFill>
-        <p:spPr>
-          <a:xfrm>
-            <a:off x="4815817" y="5208459"/>
-            <a:ext cx="549285" cy="189573"/>
-          </a:xfrm>
-          <a:prstGeom prst="rect">
-            <a:avLst/>
-          </a:prstGeom>
-        </p:spPr>
-      </p:pic>
-      <p:pic>
-        <p:nvPicPr>
-          <p:cNvPr id="10" name="Picture 9"/>
-          <p:cNvPicPr>
-            <a:picLocks noChangeAspect="1"/>
-          </p:cNvPicPr>
-          <p:nvPr/>
-        </p:nvPicPr>
-        <p:blipFill>
-          <a:blip r:embed="rId5"/>
-          <a:stretch>
-            <a:fillRect/>
-          </a:stretch>
-        </p:blipFill>
-        <p:spPr>
-          <a:xfrm>
-            <a:off x="11079768" y="5207177"/>
-            <a:ext cx="549285" cy="189573"/>
-          </a:xfrm>
-          <a:prstGeom prst="rect">
-            <a:avLst/>
-          </a:prstGeom>
-        </p:spPr>
-      </p:pic>
-      <p:pic>
-        <p:nvPicPr>
-          <p:cNvPr id="11" name="Picture 10"/>
-          <p:cNvPicPr>
-            <a:picLocks noChangeAspect="1"/>
-          </p:cNvPicPr>
-          <p:nvPr/>
-        </p:nvPicPr>
-        <p:blipFill>
-          <a:blip r:embed="rId6"/>
-          <a:stretch>
-            <a:fillRect/>
-          </a:stretch>
-        </p:blipFill>
-        <p:spPr>
-          <a:xfrm>
-            <a:off x="157222" y="1250887"/>
-            <a:ext cx="209122" cy="472460"/>
-          </a:xfrm>
-          <a:prstGeom prst="rect">
-            <a:avLst/>
-          </a:prstGeom>
-        </p:spPr>
-      </p:pic>
-      <p:pic>
-        <p:nvPicPr>
-          <p:cNvPr id="14" name="Picture 13"/>
-          <p:cNvPicPr>
-            <a:picLocks noChangeAspect="1"/>
-          </p:cNvPicPr>
-          <p:nvPr/>
-        </p:nvPicPr>
-        <p:blipFill>
-          <a:blip r:embed="rId6"/>
-          <a:stretch>
-            <a:fillRect/>
-          </a:stretch>
-        </p:blipFill>
-        <p:spPr>
-          <a:xfrm>
-            <a:off x="6458496" y="1332045"/>
-            <a:ext cx="209122" cy="472460"/>
-          </a:xfrm>
-          <a:prstGeom prst="rect">
-            <a:avLst/>
-          </a:prstGeom>
-        </p:spPr>
-      </p:pic>
-    </p:spTree>
-    <p:extLst>
-      <p:ext uri="{BB962C8B-B14F-4D97-AF65-F5344CB8AC3E}">
-        <p14:creationId xmlns:p14="http://schemas.microsoft.com/office/powerpoint/2010/main" val="1919429513"/>
-      </p:ext>
-    </p:extLst>
-  </p:cSld>
-  <p:clrMapOvr>
-    <a:masterClrMapping/>
-  </p:clrMapOvr>
-</p:sld>
-</file>
-
-<file path=ppt/slides/slide9.xml><?xml version="1.0" encoding="utf-8"?>
-<p:sld xmlns:a="http://schemas.openxmlformats.org/drawingml/2006/main" xmlns:r="http://schemas.openxmlformats.org/officeDocument/2006/relationships" xmlns:p="http://schemas.openxmlformats.org/presentationml/2006/main">
-  <p:cSld>
-    <p:spTree>
-      <p:nvGrpSpPr>
-        <p:cNvPr id="1" name=""/>
-        <p:cNvGrpSpPr/>
-        <p:nvPr/>
-      </p:nvGrpSpPr>
-      <p:grpSpPr>
-        <a:xfrm>
-          <a:off x="0" y="0"/>
-          <a:ext cx="0" cy="0"/>
-          <a:chOff x="0" y="0"/>
-          <a:chExt cx="0" cy="0"/>
-        </a:xfrm>
-      </p:grpSpPr>
-      <p:sp>
-        <p:nvSpPr>
-          <p:cNvPr id="2" name="Date Placeholder 1"/>
-          <p:cNvSpPr>
-            <a:spLocks noGrp="1"/>
-          </p:cNvSpPr>
-          <p:nvPr>
-            <p:ph type="dt" sz="half" idx="10"/>
-          </p:nvPr>
-        </p:nvSpPr>
-        <p:spPr/>
-        <p:txBody>
-          <a:bodyPr/>
-          <a:lstStyle/>
-          <a:p>
-            <a:fld id="{482AA653-8872-4AEA-B19D-0BF0F1064A5A}" type="datetime3">
-              <a:rPr lang="en-US" smtClean="0"/>
-              <a:t>28 May 2019</a:t>
-            </a:fld>
-            <a:endParaRPr lang="en-US"/>
-          </a:p>
-        </p:txBody>
-      </p:sp>
-      <p:sp>
-        <p:nvSpPr>
-          <p:cNvPr id="3" name="Footer Placeholder 2"/>
-          <p:cNvSpPr>
-            <a:spLocks noGrp="1"/>
-          </p:cNvSpPr>
-          <p:nvPr>
-            <p:ph type="ftr" sz="quarter" idx="11"/>
-          </p:nvPr>
-        </p:nvSpPr>
-        <p:spPr/>
-        <p:txBody>
-          <a:bodyPr/>
-          <a:lstStyle/>
-          <a:p>
-            <a:r>
-              <a:rPr lang="fi-FI"/>
-              <a:t>NTUA, G. Bakas</a:t>
-            </a:r>
-            <a:endParaRPr lang="en-US"/>
-          </a:p>
-        </p:txBody>
-      </p:sp>
-      <p:sp>
-        <p:nvSpPr>
-          <p:cNvPr id="6" name="Slide Number Placeholder 5"/>
-          <p:cNvSpPr>
-            <a:spLocks noGrp="1"/>
-          </p:cNvSpPr>
-          <p:nvPr>
-            <p:ph type="sldNum" sz="quarter" idx="12"/>
-          </p:nvPr>
-        </p:nvSpPr>
-        <p:spPr/>
-        <p:txBody>
-          <a:bodyPr/>
-          <a:lstStyle/>
-          <a:p>
-            <a:fld id="{AEEFAC8D-0A19-DC49-9F7A-4BFCAD95B105}" type="slidenum">
-              <a:rPr lang="en-US" smtClean="0"/>
-              <a:t>9</a:t>
-            </a:fld>
-            <a:endParaRPr lang="en-US"/>
-          </a:p>
-        </p:txBody>
-      </p:sp>
-      <p:pic>
-        <p:nvPicPr>
-          <p:cNvPr id="7" name="Picture 6"/>
-          <p:cNvPicPr>
-            <a:picLocks noChangeAspect="1"/>
-          </p:cNvPicPr>
-          <p:nvPr/>
-        </p:nvPicPr>
-        <p:blipFill>
-          <a:blip r:embed="rId3">
-            <a:extLst>
-              <a:ext uri="{28A0092B-C50C-407E-A947-70E740481C1C}">
-                <a14:useLocalDpi xmlns:a14="http://schemas.microsoft.com/office/drawing/2010/main" val="0"/>
-              </a:ext>
-            </a:extLst>
-          </a:blip>
-          <a:stretch>
-            <a:fillRect/>
-          </a:stretch>
-        </p:blipFill>
-        <p:spPr>
-          <a:xfrm>
-            <a:off x="1819275" y="700087"/>
-            <a:ext cx="8553450" cy="5457825"/>
-          </a:xfrm>
-          <a:prstGeom prst="rect">
-            <a:avLst/>
-          </a:prstGeom>
-        </p:spPr>
-      </p:pic>
-      <p:pic>
-        <p:nvPicPr>
-          <p:cNvPr id="8" name="Picture 7"/>
-          <p:cNvPicPr>
-            <a:picLocks noChangeAspect="1"/>
-          </p:cNvPicPr>
-          <p:nvPr/>
-        </p:nvPicPr>
-        <p:blipFill>
-          <a:blip r:embed="rId4"/>
-          <a:stretch>
-            <a:fillRect/>
-          </a:stretch>
-        </p:blipFill>
-        <p:spPr>
-          <a:xfrm>
-            <a:off x="2228854" y="1244374"/>
-            <a:ext cx="209122" cy="472460"/>
-          </a:xfrm>
-          <a:prstGeom prst="rect">
-            <a:avLst/>
-          </a:prstGeom>
-        </p:spPr>
-      </p:pic>
-      <p:pic>
-        <p:nvPicPr>
-          <p:cNvPr id="10" name="Picture 9"/>
-          <p:cNvPicPr>
-            <a:picLocks noChangeAspect="1"/>
-          </p:cNvPicPr>
-          <p:nvPr/>
-        </p:nvPicPr>
-        <p:blipFill>
-          <a:blip r:embed="rId5"/>
-          <a:stretch>
-            <a:fillRect/>
-          </a:stretch>
-        </p:blipFill>
-        <p:spPr>
-          <a:xfrm>
-            <a:off x="8971050" y="5813667"/>
-            <a:ext cx="549285" cy="189573"/>
-          </a:xfrm>
-          <a:prstGeom prst="rect">
-            <a:avLst/>
-          </a:prstGeom>
-        </p:spPr>
-      </p:pic>
-    </p:spTree>
-    <p:extLst>
-      <p:ext uri="{BB962C8B-B14F-4D97-AF65-F5344CB8AC3E}">
-        <p14:creationId xmlns:p14="http://schemas.microsoft.com/office/powerpoint/2010/main" val="2604188727"/>
       </p:ext>
     </p:extLst>
   </p:cSld>

</xml_diff>